<commit_message>
pushing updates to wahoo site for GRIT Tech Tips from EXCIT meeting and Huron Agreement PPTs
</commit_message>
<xml_diff>
--- a/files/GRITTechTips.pptx
+++ b/files/GRITTechTips.pptx
@@ -6,10 +6,10 @@
     <p:sldMasterId id="2147483676" r:id="rId2"/>
   </p:sldMasterIdLst>
   <p:notesMasterIdLst>
-    <p:notesMasterId r:id="rId18"/>
+    <p:notesMasterId r:id="rId20"/>
   </p:notesMasterIdLst>
   <p:handoutMasterIdLst>
-    <p:handoutMasterId r:id="rId19"/>
+    <p:handoutMasterId r:id="rId21"/>
   </p:handoutMasterIdLst>
   <p:sldIdLst>
     <p:sldId id="265" r:id="rId3"/>
@@ -27,6 +27,8 @@
     <p:sldId id="1559" r:id="rId15"/>
     <p:sldId id="1562" r:id="rId16"/>
     <p:sldId id="1563" r:id="rId17"/>
+    <p:sldId id="1584" r:id="rId18"/>
+    <p:sldId id="1585" r:id="rId19"/>
   </p:sldIdLst>
   <p:sldSz cx="12192000" cy="6858000"/>
   <p:notesSz cx="7010400" cy="9296400"/>
@@ -229,7 +231,7 @@
           <a:p>
             <a:fld id="{1B2B353B-17DE-F24E-9686-9B8AC9ABF674}" type="datetimeFigureOut">
               <a:rPr lang="en-US" smtClean="0"/>
-              <a:t>2/19/2020</a:t>
+              <a:t>3/30/2020</a:t>
             </a:fld>
             <a:endParaRPr lang="en-US" dirty="0"/>
           </a:p>
@@ -394,7 +396,7 @@
           <a:p>
             <a:fld id="{6A5E00F6-FCEB-3240-BF91-2FE8D291BB05}" type="datetimeFigureOut">
               <a:rPr lang="en-US" smtClean="0"/>
-              <a:t>2/19/2020</a:t>
+              <a:t>3/30/2020</a:t>
             </a:fld>
             <a:endParaRPr lang="en-US" dirty="0"/>
           </a:p>
@@ -1330,6 +1332,208 @@
 </p:notes>
 </file>
 
+<file path=ppt/notesSlides/notesSlide15.xml><?xml version="1.0" encoding="utf-8"?>
+<p:notes xmlns:a="http://schemas.openxmlformats.org/drawingml/2006/main" xmlns:r="http://schemas.openxmlformats.org/officeDocument/2006/relationships" xmlns:p="http://schemas.openxmlformats.org/presentationml/2006/main">
+  <p:cSld>
+    <p:spTree>
+      <p:nvGrpSpPr>
+        <p:cNvPr id="1" name=""/>
+        <p:cNvGrpSpPr/>
+        <p:nvPr/>
+      </p:nvGrpSpPr>
+      <p:grpSpPr>
+        <a:xfrm>
+          <a:off x="0" y="0"/>
+          <a:ext cx="0" cy="0"/>
+          <a:chOff x="0" y="0"/>
+          <a:chExt cx="0" cy="0"/>
+        </a:xfrm>
+      </p:grpSpPr>
+      <p:sp>
+        <p:nvSpPr>
+          <p:cNvPr id="2" name="Slide Image Placeholder 1"/>
+          <p:cNvSpPr>
+            <a:spLocks noGrp="1" noRot="1" noChangeAspect="1"/>
+          </p:cNvSpPr>
+          <p:nvPr>
+            <p:ph type="sldImg"/>
+          </p:nvPr>
+        </p:nvSpPr>
+        <p:spPr/>
+      </p:sp>
+      <p:sp>
+        <p:nvSpPr>
+          <p:cNvPr id="3" name="Notes Placeholder 2"/>
+          <p:cNvSpPr>
+            <a:spLocks noGrp="1"/>
+          </p:cNvSpPr>
+          <p:nvPr>
+            <p:ph type="body" idx="1"/>
+          </p:nvPr>
+        </p:nvSpPr>
+        <p:spPr/>
+        <p:txBody>
+          <a:bodyPr/>
+          <a:lstStyle/>
+          <a:p>
+            <a:pPr marL="0" marR="0" lvl="0" indent="0" algn="l" defTabSz="914400" rtl="0" eaLnBrk="1" fontAlgn="auto" latinLnBrk="0" hangingPunct="1">
+              <a:lnSpc>
+                <a:spcPct val="100000"/>
+              </a:lnSpc>
+              <a:spcBef>
+                <a:spcPts val="0"/>
+              </a:spcBef>
+              <a:spcAft>
+                <a:spcPts val="0"/>
+              </a:spcAft>
+              <a:buClrTx/>
+              <a:buSzTx/>
+              <a:buFontTx/>
+              <a:buNone/>
+              <a:tabLst/>
+              <a:defRPr/>
+            </a:pPr>
+            <a:endParaRPr lang="en-US" dirty="0"/>
+          </a:p>
+        </p:txBody>
+      </p:sp>
+      <p:sp>
+        <p:nvSpPr>
+          <p:cNvPr id="4" name="Slide Number Placeholder 3"/>
+          <p:cNvSpPr>
+            <a:spLocks noGrp="1"/>
+          </p:cNvSpPr>
+          <p:nvPr>
+            <p:ph type="sldNum" sz="quarter" idx="10"/>
+          </p:nvPr>
+        </p:nvSpPr>
+        <p:spPr/>
+        <p:txBody>
+          <a:bodyPr/>
+          <a:lstStyle/>
+          <a:p>
+            <a:fld id="{BF01AEB7-DF1E-074E-AD3C-BD912806E15D}" type="slidenum">
+              <a:rPr lang="en-US" smtClean="0"/>
+              <a:t>16</a:t>
+            </a:fld>
+            <a:endParaRPr lang="en-US" dirty="0"/>
+          </a:p>
+        </p:txBody>
+      </p:sp>
+    </p:spTree>
+    <p:extLst>
+      <p:ext uri="{BB962C8B-B14F-4D97-AF65-F5344CB8AC3E}">
+        <p14:creationId xmlns:p14="http://schemas.microsoft.com/office/powerpoint/2010/main" val="1440705226"/>
+      </p:ext>
+    </p:extLst>
+  </p:cSld>
+  <p:clrMapOvr>
+    <a:masterClrMapping/>
+  </p:clrMapOvr>
+</p:notes>
+</file>
+
+<file path=ppt/notesSlides/notesSlide16.xml><?xml version="1.0" encoding="utf-8"?>
+<p:notes xmlns:a="http://schemas.openxmlformats.org/drawingml/2006/main" xmlns:r="http://schemas.openxmlformats.org/officeDocument/2006/relationships" xmlns:p="http://schemas.openxmlformats.org/presentationml/2006/main">
+  <p:cSld>
+    <p:spTree>
+      <p:nvGrpSpPr>
+        <p:cNvPr id="1" name=""/>
+        <p:cNvGrpSpPr/>
+        <p:nvPr/>
+      </p:nvGrpSpPr>
+      <p:grpSpPr>
+        <a:xfrm>
+          <a:off x="0" y="0"/>
+          <a:ext cx="0" cy="0"/>
+          <a:chOff x="0" y="0"/>
+          <a:chExt cx="0" cy="0"/>
+        </a:xfrm>
+      </p:grpSpPr>
+      <p:sp>
+        <p:nvSpPr>
+          <p:cNvPr id="2" name="Slide Image Placeholder 1"/>
+          <p:cNvSpPr>
+            <a:spLocks noGrp="1" noRot="1" noChangeAspect="1"/>
+          </p:cNvSpPr>
+          <p:nvPr>
+            <p:ph type="sldImg"/>
+          </p:nvPr>
+        </p:nvSpPr>
+        <p:spPr/>
+      </p:sp>
+      <p:sp>
+        <p:nvSpPr>
+          <p:cNvPr id="3" name="Notes Placeholder 2"/>
+          <p:cNvSpPr>
+            <a:spLocks noGrp="1"/>
+          </p:cNvSpPr>
+          <p:nvPr>
+            <p:ph type="body" idx="1"/>
+          </p:nvPr>
+        </p:nvSpPr>
+        <p:spPr/>
+        <p:txBody>
+          <a:bodyPr/>
+          <a:lstStyle/>
+          <a:p>
+            <a:pPr marL="0" marR="0" lvl="0" indent="0" algn="l" defTabSz="914400" rtl="0" eaLnBrk="1" fontAlgn="auto" latinLnBrk="0" hangingPunct="1">
+              <a:lnSpc>
+                <a:spcPct val="100000"/>
+              </a:lnSpc>
+              <a:spcBef>
+                <a:spcPts val="0"/>
+              </a:spcBef>
+              <a:spcAft>
+                <a:spcPts val="0"/>
+              </a:spcAft>
+              <a:buClrTx/>
+              <a:buSzTx/>
+              <a:buFontTx/>
+              <a:buNone/>
+              <a:tabLst/>
+              <a:defRPr/>
+            </a:pPr>
+            <a:endParaRPr lang="en-US" dirty="0"/>
+          </a:p>
+        </p:txBody>
+      </p:sp>
+      <p:sp>
+        <p:nvSpPr>
+          <p:cNvPr id="4" name="Slide Number Placeholder 3"/>
+          <p:cNvSpPr>
+            <a:spLocks noGrp="1"/>
+          </p:cNvSpPr>
+          <p:nvPr>
+            <p:ph type="sldNum" sz="quarter" idx="10"/>
+          </p:nvPr>
+        </p:nvSpPr>
+        <p:spPr/>
+        <p:txBody>
+          <a:bodyPr/>
+          <a:lstStyle/>
+          <a:p>
+            <a:fld id="{BF01AEB7-DF1E-074E-AD3C-BD912806E15D}" type="slidenum">
+              <a:rPr lang="en-US" smtClean="0"/>
+              <a:t>17</a:t>
+            </a:fld>
+            <a:endParaRPr lang="en-US" dirty="0"/>
+          </a:p>
+        </p:txBody>
+      </p:sp>
+    </p:spTree>
+    <p:extLst>
+      <p:ext uri="{BB962C8B-B14F-4D97-AF65-F5344CB8AC3E}">
+        <p14:creationId xmlns:p14="http://schemas.microsoft.com/office/powerpoint/2010/main" val="97190617"/>
+      </p:ext>
+    </p:extLst>
+  </p:cSld>
+  <p:clrMapOvr>
+    <a:masterClrMapping/>
+  </p:clrMapOvr>
+</p:notes>
+</file>
+
 <file path=ppt/notesSlides/notesSlide2.xml><?xml version="1.0" encoding="utf-8"?>
 <p:notes xmlns:a="http://schemas.openxmlformats.org/drawingml/2006/main" xmlns:r="http://schemas.openxmlformats.org/officeDocument/2006/relationships" xmlns:p="http://schemas.openxmlformats.org/presentationml/2006/main">
   <p:cSld>
@@ -2372,7 +2576,7 @@
           <a:p>
             <a:fld id="{05F0F182-A738-D344-AD4C-0014E2FCF0E4}" type="datetimeFigureOut">
               <a:rPr lang="en-US" smtClean="0"/>
-              <a:t>2/19/2020</a:t>
+              <a:t>3/30/2020</a:t>
             </a:fld>
             <a:endParaRPr lang="en-US" dirty="0"/>
           </a:p>
@@ -2550,7 +2754,7 @@
           <a:p>
             <a:fld id="{05F0F182-A738-D344-AD4C-0014E2FCF0E4}" type="datetimeFigureOut">
               <a:rPr lang="en-US" smtClean="0"/>
-              <a:t>2/19/2020</a:t>
+              <a:t>3/30/2020</a:t>
             </a:fld>
             <a:endParaRPr lang="en-US" dirty="0"/>
           </a:p>
@@ -2738,7 +2942,7 @@
           <a:p>
             <a:fld id="{05F0F182-A738-D344-AD4C-0014E2FCF0E4}" type="datetimeFigureOut">
               <a:rPr lang="en-US" smtClean="0"/>
-              <a:t>2/19/2020</a:t>
+              <a:t>3/30/2020</a:t>
             </a:fld>
             <a:endParaRPr lang="en-US" dirty="0"/>
           </a:p>
@@ -3111,7 +3315,7 @@
                 </a:solidFill>
               </a:rPr>
               <a:pPr/>
-              <a:t>2/19/2020</a:t>
+              <a:t>3/30/2020</a:t>
             </a:fld>
             <a:endParaRPr lang="en-US" dirty="0">
               <a:solidFill>
@@ -3403,7 +3607,7 @@
                 </a:solidFill>
               </a:rPr>
               <a:pPr/>
-              <a:t>2/19/2020</a:t>
+              <a:t>3/30/2020</a:t>
             </a:fld>
             <a:endParaRPr lang="en-US" dirty="0">
               <a:solidFill>
@@ -3737,7 +3941,7 @@
                 </a:solidFill>
               </a:rPr>
               <a:pPr/>
-              <a:t>2/19/2020</a:t>
+              <a:t>3/30/2020</a:t>
             </a:fld>
             <a:endParaRPr lang="en-US" dirty="0">
               <a:solidFill>
@@ -4205,7 +4409,7 @@
                 </a:solidFill>
               </a:rPr>
               <a:pPr/>
-              <a:t>2/19/2020</a:t>
+              <a:t>3/30/2020</a:t>
             </a:fld>
             <a:endParaRPr lang="en-US" dirty="0">
               <a:solidFill>
@@ -4369,7 +4573,7 @@
                 </a:solidFill>
               </a:rPr>
               <a:pPr/>
-              <a:t>2/19/2020</a:t>
+              <a:t>3/30/2020</a:t>
             </a:fld>
             <a:endParaRPr lang="en-US" dirty="0">
               <a:solidFill>
@@ -4510,7 +4714,7 @@
                 </a:solidFill>
               </a:rPr>
               <a:pPr/>
-              <a:t>2/19/2020</a:t>
+              <a:t>3/30/2020</a:t>
             </a:fld>
             <a:endParaRPr lang="en-US" dirty="0">
               <a:solidFill>
@@ -4833,7 +5037,7 @@
                 </a:solidFill>
               </a:rPr>
               <a:pPr/>
-              <a:t>2/19/2020</a:t>
+              <a:t>3/30/2020</a:t>
             </a:fld>
             <a:endParaRPr lang="en-US" dirty="0">
               <a:solidFill>
@@ -5036,7 +5240,7 @@
           <a:p>
             <a:fld id="{05F0F182-A738-D344-AD4C-0014E2FCF0E4}" type="datetimeFigureOut">
               <a:rPr lang="en-US" smtClean="0"/>
-              <a:t>2/19/2020</a:t>
+              <a:t>3/30/2020</a:t>
             </a:fld>
             <a:endParaRPr lang="en-US" dirty="0"/>
           </a:p>
@@ -5320,7 +5524,7 @@
                 </a:solidFill>
               </a:rPr>
               <a:pPr/>
-              <a:t>2/19/2020</a:t>
+              <a:t>3/30/2020</a:t>
             </a:fld>
             <a:endParaRPr lang="en-US" dirty="0">
               <a:solidFill>
@@ -5536,7 +5740,7 @@
                 </a:solidFill>
               </a:rPr>
               <a:pPr/>
-              <a:t>2/19/2020</a:t>
+              <a:t>3/30/2020</a:t>
             </a:fld>
             <a:endParaRPr lang="en-US" dirty="0">
               <a:solidFill>
@@ -5762,7 +5966,7 @@
                 </a:solidFill>
               </a:rPr>
               <a:pPr/>
-              <a:t>2/19/2020</a:t>
+              <a:t>3/30/2020</a:t>
             </a:fld>
             <a:endParaRPr lang="en-US" dirty="0">
               <a:solidFill>
@@ -6039,7 +6243,7 @@
           <a:p>
             <a:fld id="{05F0F182-A738-D344-AD4C-0014E2FCF0E4}" type="datetimeFigureOut">
               <a:rPr lang="en-US" smtClean="0"/>
-              <a:t>2/19/2020</a:t>
+              <a:t>3/30/2020</a:t>
             </a:fld>
             <a:endParaRPr lang="en-US" dirty="0"/>
           </a:p>
@@ -6279,7 +6483,7 @@
           <a:p>
             <a:fld id="{05F0F182-A738-D344-AD4C-0014E2FCF0E4}" type="datetimeFigureOut">
               <a:rPr lang="en-US" smtClean="0"/>
-              <a:t>2/19/2020</a:t>
+              <a:t>3/30/2020</a:t>
             </a:fld>
             <a:endParaRPr lang="en-US" dirty="0"/>
           </a:p>
@@ -6654,7 +6858,7 @@
           <a:p>
             <a:fld id="{05F0F182-A738-D344-AD4C-0014E2FCF0E4}" type="datetimeFigureOut">
               <a:rPr lang="en-US" smtClean="0"/>
-              <a:t>2/19/2020</a:t>
+              <a:t>3/30/2020</a:t>
             </a:fld>
             <a:endParaRPr lang="en-US" dirty="0"/>
           </a:p>
@@ -6882,7 +7086,7 @@
           <a:p>
             <a:fld id="{05F0F182-A738-D344-AD4C-0014E2FCF0E4}" type="datetimeFigureOut">
               <a:rPr lang="en-US" smtClean="0"/>
-              <a:t>2/19/2020</a:t>
+              <a:t>3/30/2020</a:t>
             </a:fld>
             <a:endParaRPr lang="en-US" dirty="0"/>
           </a:p>
@@ -7167,7 +7371,7 @@
           <a:p>
             <a:fld id="{05F0F182-A738-D344-AD4C-0014E2FCF0E4}" type="datetimeFigureOut">
               <a:rPr lang="en-US" smtClean="0"/>
-              <a:t>2/19/2020</a:t>
+              <a:t>3/30/2020</a:t>
             </a:fld>
             <a:endParaRPr lang="en-US" dirty="0"/>
           </a:p>
@@ -7431,7 +7635,7 @@
           <a:p>
             <a:fld id="{05F0F182-A738-D344-AD4C-0014E2FCF0E4}" type="datetimeFigureOut">
               <a:rPr lang="en-US" smtClean="0"/>
-              <a:t>2/19/2020</a:t>
+              <a:t>3/30/2020</a:t>
             </a:fld>
             <a:endParaRPr lang="en-US" dirty="0"/>
           </a:p>
@@ -7700,7 +7904,7 @@
             <a:fld id="{05F0F182-A738-D344-AD4C-0014E2FCF0E4}" type="datetimeFigureOut">
               <a:rPr lang="en-US" smtClean="0"/>
               <a:pPr/>
-              <a:t>2/19/2020</a:t>
+              <a:t>3/30/2020</a:t>
             </a:fld>
             <a:endParaRPr lang="en-US" dirty="0"/>
           </a:p>
@@ -10115,6 +10319,587 @@
     <p:extLst>
       <p:ext uri="{BB962C8B-B14F-4D97-AF65-F5344CB8AC3E}">
         <p14:creationId xmlns:p14="http://schemas.microsoft.com/office/powerpoint/2010/main" val="679815159"/>
+      </p:ext>
+    </p:extLst>
+  </p:cSld>
+  <p:clrMapOvr>
+    <a:masterClrMapping/>
+  </p:clrMapOvr>
+  <p:timing>
+    <p:tnLst>
+      <p:par>
+        <p:cTn id="1" dur="indefinite" restart="never" nodeType="tmRoot"/>
+      </p:par>
+    </p:tnLst>
+  </p:timing>
+</p:sld>
+</file>
+
+<file path=ppt/slides/slide16.xml><?xml version="1.0" encoding="utf-8"?>
+<p:sld xmlns:a="http://schemas.openxmlformats.org/drawingml/2006/main" xmlns:r="http://schemas.openxmlformats.org/officeDocument/2006/relationships" xmlns:p="http://schemas.openxmlformats.org/presentationml/2006/main">
+  <p:cSld>
+    <p:spTree>
+      <p:nvGrpSpPr>
+        <p:cNvPr id="1" name=""/>
+        <p:cNvGrpSpPr/>
+        <p:nvPr/>
+      </p:nvGrpSpPr>
+      <p:grpSpPr>
+        <a:xfrm>
+          <a:off x="0" y="0"/>
+          <a:ext cx="0" cy="0"/>
+          <a:chOff x="0" y="0"/>
+          <a:chExt cx="0" cy="0"/>
+        </a:xfrm>
+      </p:grpSpPr>
+      <p:sp>
+        <p:nvSpPr>
+          <p:cNvPr id="2" name="Title 1"/>
+          <p:cNvSpPr>
+            <a:spLocks noGrp="1"/>
+          </p:cNvSpPr>
+          <p:nvPr>
+            <p:ph type="title"/>
+          </p:nvPr>
+        </p:nvSpPr>
+        <p:spPr>
+          <a:xfrm>
+            <a:off x="838200" y="365128"/>
+            <a:ext cx="10515600" cy="617511"/>
+          </a:xfrm>
+        </p:spPr>
+        <p:txBody>
+          <a:bodyPr>
+            <a:noAutofit/>
+          </a:bodyPr>
+          <a:lstStyle/>
+          <a:p>
+            <a:r>
+              <a:rPr lang="en-US" dirty="0"/>
+              <a:t>Huron Grants – Tech Tips</a:t>
+            </a:r>
+          </a:p>
+        </p:txBody>
+      </p:sp>
+      <p:sp>
+        <p:nvSpPr>
+          <p:cNvPr id="7" name="TextBox 6"/>
+          <p:cNvSpPr txBox="1"/>
+          <p:nvPr/>
+        </p:nvSpPr>
+        <p:spPr>
+          <a:xfrm>
+            <a:off x="9760819" y="97917"/>
+            <a:ext cx="2251510" cy="369332"/>
+          </a:xfrm>
+          <a:prstGeom prst="rect">
+            <a:avLst/>
+          </a:prstGeom>
+          <a:noFill/>
+          <a:ln>
+            <a:solidFill>
+              <a:schemeClr val="tx1"/>
+            </a:solidFill>
+          </a:ln>
+        </p:spPr>
+        <p:txBody>
+          <a:bodyPr wrap="square" rtlCol="0">
+            <a:spAutoFit/>
+          </a:bodyPr>
+          <a:lstStyle/>
+          <a:p>
+            <a:r>
+              <a:rPr lang="en-US" dirty="0" smtClean="0"/>
+              <a:t>Presented on </a:t>
+            </a:r>
+            <a:r>
+              <a:rPr lang="en-US" dirty="0" smtClean="0"/>
+              <a:t>3/25/20</a:t>
+            </a:r>
+            <a:endParaRPr lang="en-US" dirty="0"/>
+          </a:p>
+        </p:txBody>
+      </p:sp>
+      <p:sp>
+        <p:nvSpPr>
+          <p:cNvPr id="8" name="Content Placeholder 2"/>
+          <p:cNvSpPr txBox="1">
+            <a:spLocks/>
+          </p:cNvSpPr>
+          <p:nvPr/>
+        </p:nvSpPr>
+        <p:spPr>
+          <a:xfrm>
+            <a:off x="370974" y="1418608"/>
+            <a:ext cx="10515600" cy="4726309"/>
+          </a:xfrm>
+          <a:prstGeom prst="rect">
+            <a:avLst/>
+          </a:prstGeom>
+        </p:spPr>
+        <p:txBody>
+          <a:bodyPr vert="horz" lIns="91440" tIns="45720" rIns="91440" bIns="45720" rtlCol="0">
+            <a:normAutofit fontScale="92500"/>
+          </a:bodyPr>
+          <a:lstStyle>
+            <a:lvl1pPr marL="228600" indent="-228600" algn="l" defTabSz="914400" rtl="0" eaLnBrk="1" latinLnBrk="0" hangingPunct="1">
+              <a:lnSpc>
+                <a:spcPct val="90000"/>
+              </a:lnSpc>
+              <a:spcBef>
+                <a:spcPts val="1000"/>
+              </a:spcBef>
+              <a:buFont typeface="Arial" panose="020B0604020202020204" pitchFamily="34" charset="0"/>
+              <a:buChar char="•"/>
+              <a:defRPr sz="2800" kern="1200">
+                <a:solidFill>
+                  <a:schemeClr val="tx1"/>
+                </a:solidFill>
+                <a:latin typeface="Helvetica Neue" charset="0"/>
+                <a:ea typeface="Helvetica Neue" charset="0"/>
+                <a:cs typeface="Helvetica Neue" charset="0"/>
+              </a:defRPr>
+            </a:lvl1pPr>
+            <a:lvl2pPr marL="685800" indent="-228600" algn="l" defTabSz="914400" rtl="0" eaLnBrk="1" latinLnBrk="0" hangingPunct="1">
+              <a:lnSpc>
+                <a:spcPct val="90000"/>
+              </a:lnSpc>
+              <a:spcBef>
+                <a:spcPts val="500"/>
+              </a:spcBef>
+              <a:buFont typeface="Arial" panose="020B0604020202020204" pitchFamily="34" charset="0"/>
+              <a:buChar char="•"/>
+              <a:defRPr sz="2400" kern="1200">
+                <a:solidFill>
+                  <a:schemeClr val="tx1"/>
+                </a:solidFill>
+                <a:latin typeface="Helvetica Neue" charset="0"/>
+                <a:ea typeface="Helvetica Neue" charset="0"/>
+                <a:cs typeface="Helvetica Neue" charset="0"/>
+              </a:defRPr>
+            </a:lvl2pPr>
+            <a:lvl3pPr marL="1143000" indent="-228600" algn="l" defTabSz="914400" rtl="0" eaLnBrk="1" latinLnBrk="0" hangingPunct="1">
+              <a:lnSpc>
+                <a:spcPct val="90000"/>
+              </a:lnSpc>
+              <a:spcBef>
+                <a:spcPts val="500"/>
+              </a:spcBef>
+              <a:buFont typeface="Arial" panose="020B0604020202020204" pitchFamily="34" charset="0"/>
+              <a:buChar char="•"/>
+              <a:defRPr sz="2000" kern="1200">
+                <a:solidFill>
+                  <a:schemeClr val="tx1"/>
+                </a:solidFill>
+                <a:latin typeface="Helvetica Neue" charset="0"/>
+                <a:ea typeface="Helvetica Neue" charset="0"/>
+                <a:cs typeface="Helvetica Neue" charset="0"/>
+              </a:defRPr>
+            </a:lvl3pPr>
+            <a:lvl4pPr marL="1600200" indent="-228600" algn="l" defTabSz="914400" rtl="0" eaLnBrk="1" latinLnBrk="0" hangingPunct="1">
+              <a:lnSpc>
+                <a:spcPct val="90000"/>
+              </a:lnSpc>
+              <a:spcBef>
+                <a:spcPts val="500"/>
+              </a:spcBef>
+              <a:buFont typeface="Arial" panose="020B0604020202020204" pitchFamily="34" charset="0"/>
+              <a:buChar char="•"/>
+              <a:defRPr sz="1800" kern="1200">
+                <a:solidFill>
+                  <a:schemeClr val="tx1"/>
+                </a:solidFill>
+                <a:latin typeface="Helvetica Neue" charset="0"/>
+                <a:ea typeface="Helvetica Neue" charset="0"/>
+                <a:cs typeface="Helvetica Neue" charset="0"/>
+              </a:defRPr>
+            </a:lvl4pPr>
+            <a:lvl5pPr marL="2057400" indent="-228600" algn="l" defTabSz="914400" rtl="0" eaLnBrk="1" latinLnBrk="0" hangingPunct="1">
+              <a:lnSpc>
+                <a:spcPct val="90000"/>
+              </a:lnSpc>
+              <a:spcBef>
+                <a:spcPts val="500"/>
+              </a:spcBef>
+              <a:buFont typeface="Arial" panose="020B0604020202020204" pitchFamily="34" charset="0"/>
+              <a:buChar char="•"/>
+              <a:defRPr sz="1800" kern="1200">
+                <a:solidFill>
+                  <a:schemeClr val="tx1"/>
+                </a:solidFill>
+                <a:latin typeface="Helvetica Neue" charset="0"/>
+                <a:ea typeface="Helvetica Neue" charset="0"/>
+                <a:cs typeface="Helvetica Neue" charset="0"/>
+              </a:defRPr>
+            </a:lvl5pPr>
+            <a:lvl6pPr marL="2514600" indent="-228600" algn="l" defTabSz="914400" rtl="0" eaLnBrk="1" latinLnBrk="0" hangingPunct="1">
+              <a:lnSpc>
+                <a:spcPct val="90000"/>
+              </a:lnSpc>
+              <a:spcBef>
+                <a:spcPts val="500"/>
+              </a:spcBef>
+              <a:buFont typeface="Arial" panose="020B0604020202020204" pitchFamily="34" charset="0"/>
+              <a:buChar char="•"/>
+              <a:defRPr sz="1800" kern="1200">
+                <a:solidFill>
+                  <a:schemeClr val="tx1"/>
+                </a:solidFill>
+                <a:latin typeface="+mn-lt"/>
+                <a:ea typeface="+mn-ea"/>
+                <a:cs typeface="+mn-cs"/>
+              </a:defRPr>
+            </a:lvl6pPr>
+            <a:lvl7pPr marL="2971800" indent="-228600" algn="l" defTabSz="914400" rtl="0" eaLnBrk="1" latinLnBrk="0" hangingPunct="1">
+              <a:lnSpc>
+                <a:spcPct val="90000"/>
+              </a:lnSpc>
+              <a:spcBef>
+                <a:spcPts val="500"/>
+              </a:spcBef>
+              <a:buFont typeface="Arial" panose="020B0604020202020204" pitchFamily="34" charset="0"/>
+              <a:buChar char="•"/>
+              <a:defRPr sz="1800" kern="1200">
+                <a:solidFill>
+                  <a:schemeClr val="tx1"/>
+                </a:solidFill>
+                <a:latin typeface="+mn-lt"/>
+                <a:ea typeface="+mn-ea"/>
+                <a:cs typeface="+mn-cs"/>
+              </a:defRPr>
+            </a:lvl7pPr>
+            <a:lvl8pPr marL="3429000" indent="-228600" algn="l" defTabSz="914400" rtl="0" eaLnBrk="1" latinLnBrk="0" hangingPunct="1">
+              <a:lnSpc>
+                <a:spcPct val="90000"/>
+              </a:lnSpc>
+              <a:spcBef>
+                <a:spcPts val="500"/>
+              </a:spcBef>
+              <a:buFont typeface="Arial" panose="020B0604020202020204" pitchFamily="34" charset="0"/>
+              <a:buChar char="•"/>
+              <a:defRPr sz="1800" kern="1200">
+                <a:solidFill>
+                  <a:schemeClr val="tx1"/>
+                </a:solidFill>
+                <a:latin typeface="+mn-lt"/>
+                <a:ea typeface="+mn-ea"/>
+                <a:cs typeface="+mn-cs"/>
+              </a:defRPr>
+            </a:lvl8pPr>
+            <a:lvl9pPr marL="3886200" indent="-228600" algn="l" defTabSz="914400" rtl="0" eaLnBrk="1" latinLnBrk="0" hangingPunct="1">
+              <a:lnSpc>
+                <a:spcPct val="90000"/>
+              </a:lnSpc>
+              <a:spcBef>
+                <a:spcPts val="500"/>
+              </a:spcBef>
+              <a:buFont typeface="Arial" panose="020B0604020202020204" pitchFamily="34" charset="0"/>
+              <a:buChar char="•"/>
+              <a:defRPr sz="1800" kern="1200">
+                <a:solidFill>
+                  <a:schemeClr val="tx1"/>
+                </a:solidFill>
+                <a:latin typeface="+mn-lt"/>
+                <a:ea typeface="+mn-ea"/>
+                <a:cs typeface="+mn-cs"/>
+              </a:defRPr>
+            </a:lvl9pPr>
+          </a:lstStyle>
+          <a:p>
+            <a:pPr lvl="1"/>
+            <a:r>
+              <a:rPr lang="en-US" dirty="0" smtClean="0"/>
+              <a:t>Deleting documents copied when the “Copy” activity is used</a:t>
+            </a:r>
+          </a:p>
+          <a:p>
+            <a:pPr lvl="2"/>
+            <a:r>
+              <a:rPr lang="en-US" dirty="0" smtClean="0"/>
+              <a:t>If a document was added when the specialist sent the proposal to the sponsor, it will show on the copied proposal and cannot be removed in the “Upload Documents” activity. Specialist can delete this document when choosing to submit the copied proposal and upload the correct one.</a:t>
+            </a:r>
+          </a:p>
+          <a:p>
+            <a:pPr marL="457200" lvl="1" indent="0">
+              <a:buFont typeface="Arial" panose="020B0604020202020204" pitchFamily="34" charset="0"/>
+              <a:buNone/>
+            </a:pPr>
+            <a:endParaRPr lang="en-US" dirty="0" smtClean="0"/>
+          </a:p>
+          <a:p>
+            <a:pPr lvl="1"/>
+            <a:r>
+              <a:rPr lang="en-US" dirty="0" smtClean="0"/>
+              <a:t>Requesting Access to Huron for New and Moved Users</a:t>
+            </a:r>
+          </a:p>
+          <a:p>
+            <a:pPr lvl="2"/>
+            <a:r>
+              <a:rPr lang="en-US" dirty="0" smtClean="0"/>
+              <a:t>Open a ticket </a:t>
+            </a:r>
+            <a:r>
+              <a:rPr lang="en-US" dirty="0" smtClean="0">
+                <a:hlinkClick r:id="rId3"/>
+              </a:rPr>
+              <a:t>GRITServiceDesk@ucf.edu</a:t>
+            </a:r>
+            <a:r>
+              <a:rPr lang="en-US" dirty="0" smtClean="0"/>
+              <a:t> and indicate to which systems the user requires access </a:t>
+            </a:r>
+          </a:p>
+          <a:p>
+            <a:pPr lvl="2"/>
+            <a:r>
+              <a:rPr lang="en-US" dirty="0" smtClean="0"/>
+              <a:t>New users are automatically added to Huron once there are provided through the PeopleSoft HR data feed</a:t>
+            </a:r>
+          </a:p>
+          <a:p>
+            <a:pPr lvl="2"/>
+            <a:r>
+              <a:rPr lang="en-US" dirty="0" smtClean="0"/>
+              <a:t>Huron Grants BA assigns access levels depending on what the user will need to do</a:t>
+            </a:r>
+          </a:p>
+          <a:p>
+            <a:pPr lvl="3"/>
+            <a:r>
+              <a:rPr lang="en-US" dirty="0" smtClean="0"/>
+              <a:t>Please provide employee name, ID and intended job function/role (Contract Manager, Department Admin., OR </a:t>
+            </a:r>
+            <a:r>
+              <a:rPr lang="en-US" dirty="0" err="1" smtClean="0"/>
+              <a:t>or</a:t>
+            </a:r>
+            <a:r>
+              <a:rPr lang="en-US" dirty="0" smtClean="0"/>
+              <a:t> Dept. student assistants, etc.) </a:t>
+            </a:r>
+          </a:p>
+          <a:p>
+            <a:pPr lvl="3"/>
+            <a:r>
+              <a:rPr lang="en-US" dirty="0" smtClean="0"/>
+              <a:t>Note: We cannot add Huron access levels until the user is available through the HR feed</a:t>
+            </a:r>
+          </a:p>
+          <a:p>
+            <a:pPr lvl="3"/>
+            <a:endParaRPr lang="en-US" dirty="0"/>
+          </a:p>
+        </p:txBody>
+      </p:sp>
+    </p:spTree>
+    <p:extLst>
+      <p:ext uri="{BB962C8B-B14F-4D97-AF65-F5344CB8AC3E}">
+        <p14:creationId xmlns:p14="http://schemas.microsoft.com/office/powerpoint/2010/main" val="412260803"/>
+      </p:ext>
+    </p:extLst>
+  </p:cSld>
+  <p:clrMapOvr>
+    <a:masterClrMapping/>
+  </p:clrMapOvr>
+  <p:timing>
+    <p:tnLst>
+      <p:par>
+        <p:cTn id="1" dur="indefinite" restart="never" nodeType="tmRoot"/>
+      </p:par>
+    </p:tnLst>
+  </p:timing>
+</p:sld>
+</file>
+
+<file path=ppt/slides/slide17.xml><?xml version="1.0" encoding="utf-8"?>
+<p:sld xmlns:a="http://schemas.openxmlformats.org/drawingml/2006/main" xmlns:r="http://schemas.openxmlformats.org/officeDocument/2006/relationships" xmlns:p="http://schemas.openxmlformats.org/presentationml/2006/main">
+  <p:cSld>
+    <p:spTree>
+      <p:nvGrpSpPr>
+        <p:cNvPr id="1" name=""/>
+        <p:cNvGrpSpPr/>
+        <p:nvPr/>
+      </p:nvGrpSpPr>
+      <p:grpSpPr>
+        <a:xfrm>
+          <a:off x="0" y="0"/>
+          <a:ext cx="0" cy="0"/>
+          <a:chOff x="0" y="0"/>
+          <a:chExt cx="0" cy="0"/>
+        </a:xfrm>
+      </p:grpSpPr>
+      <p:sp>
+        <p:nvSpPr>
+          <p:cNvPr id="2" name="Title 1"/>
+          <p:cNvSpPr>
+            <a:spLocks noGrp="1"/>
+          </p:cNvSpPr>
+          <p:nvPr>
+            <p:ph type="title"/>
+          </p:nvPr>
+        </p:nvSpPr>
+        <p:spPr>
+          <a:xfrm>
+            <a:off x="838200" y="365128"/>
+            <a:ext cx="10515600" cy="617511"/>
+          </a:xfrm>
+        </p:spPr>
+        <p:txBody>
+          <a:bodyPr>
+            <a:noAutofit/>
+          </a:bodyPr>
+          <a:lstStyle/>
+          <a:p>
+            <a:r>
+              <a:rPr lang="en-US" dirty="0"/>
+              <a:t>Huron Grants – Tech Tips</a:t>
+            </a:r>
+          </a:p>
+        </p:txBody>
+      </p:sp>
+      <p:sp>
+        <p:nvSpPr>
+          <p:cNvPr id="7" name="TextBox 6"/>
+          <p:cNvSpPr txBox="1"/>
+          <p:nvPr/>
+        </p:nvSpPr>
+        <p:spPr>
+          <a:xfrm>
+            <a:off x="9760819" y="97917"/>
+            <a:ext cx="2251510" cy="369332"/>
+          </a:xfrm>
+          <a:prstGeom prst="rect">
+            <a:avLst/>
+          </a:prstGeom>
+          <a:noFill/>
+          <a:ln>
+            <a:solidFill>
+              <a:schemeClr val="tx1"/>
+            </a:solidFill>
+          </a:ln>
+        </p:spPr>
+        <p:txBody>
+          <a:bodyPr wrap="square" rtlCol="0">
+            <a:spAutoFit/>
+          </a:bodyPr>
+          <a:lstStyle/>
+          <a:p>
+            <a:r>
+              <a:rPr lang="en-US" dirty="0" smtClean="0"/>
+              <a:t>Presented on </a:t>
+            </a:r>
+            <a:r>
+              <a:rPr lang="en-US" dirty="0" smtClean="0"/>
+              <a:t>3/25/20</a:t>
+            </a:r>
+            <a:endParaRPr lang="en-US" dirty="0"/>
+          </a:p>
+        </p:txBody>
+      </p:sp>
+      <p:sp>
+        <p:nvSpPr>
+          <p:cNvPr id="5" name="Content Placeholder 2"/>
+          <p:cNvSpPr>
+            <a:spLocks noGrp="1"/>
+          </p:cNvSpPr>
+          <p:nvPr>
+            <p:ph idx="1"/>
+          </p:nvPr>
+        </p:nvSpPr>
+        <p:spPr>
+          <a:xfrm>
+            <a:off x="370974" y="1380817"/>
+            <a:ext cx="10515600" cy="4726309"/>
+          </a:xfrm>
+        </p:spPr>
+        <p:txBody>
+          <a:bodyPr>
+            <a:normAutofit/>
+          </a:bodyPr>
+          <a:lstStyle/>
+          <a:p>
+            <a:pPr lvl="1"/>
+            <a:r>
+              <a:rPr lang="en-US" dirty="0"/>
+              <a:t>Adding New Department Administrators to Workflows</a:t>
+            </a:r>
+          </a:p>
+          <a:p>
+            <a:pPr lvl="2"/>
+            <a:r>
+              <a:rPr lang="en-US" dirty="0"/>
+              <a:t>Requires a Huron support ticket</a:t>
+            </a:r>
+          </a:p>
+          <a:p>
+            <a:pPr lvl="2"/>
+            <a:r>
+              <a:rPr lang="en-US" dirty="0"/>
+              <a:t>Provide all departments within the college to which the department admin will need to be added</a:t>
+            </a:r>
+          </a:p>
+          <a:p>
+            <a:pPr lvl="2"/>
+            <a:r>
+              <a:rPr lang="en-US" dirty="0"/>
+              <a:t>New users will be added to workflow for all new records created</a:t>
+            </a:r>
+          </a:p>
+          <a:p>
+            <a:pPr marL="457200" lvl="1" indent="0">
+              <a:buNone/>
+            </a:pPr>
+            <a:endParaRPr lang="en-US" dirty="0"/>
+          </a:p>
+          <a:p>
+            <a:pPr lvl="1"/>
+            <a:r>
+              <a:rPr lang="en-US" dirty="0"/>
+              <a:t>Adding Users to Records in Departments and Colleges</a:t>
+            </a:r>
+          </a:p>
+          <a:p>
+            <a:pPr lvl="2"/>
+            <a:r>
+              <a:rPr lang="en-US" dirty="0"/>
+              <a:t>New users in departments will need access to the existing records</a:t>
+            </a:r>
+          </a:p>
+          <a:p>
+            <a:pPr lvl="2"/>
+            <a:r>
+              <a:rPr lang="en-US" dirty="0"/>
+              <a:t>Use the “Manage Guest List” activity to add or remove people to specific records</a:t>
+            </a:r>
+          </a:p>
+          <a:p>
+            <a:pPr lvl="2"/>
+            <a:r>
+              <a:rPr lang="en-US" dirty="0"/>
+              <a:t>Can use Huron Support to add people with a bulk upload but this is reserved to large amounts of records (50 or more).</a:t>
+            </a:r>
+          </a:p>
+          <a:p>
+            <a:pPr lvl="2"/>
+            <a:endParaRPr lang="en-US" dirty="0"/>
+          </a:p>
+          <a:p>
+            <a:pPr marL="457200" lvl="1" indent="0">
+              <a:buNone/>
+            </a:pPr>
+            <a:endParaRPr lang="en-US" dirty="0"/>
+          </a:p>
+          <a:p>
+            <a:pPr lvl="3"/>
+            <a:endParaRPr lang="en-US" dirty="0"/>
+          </a:p>
+        </p:txBody>
+      </p:sp>
+    </p:spTree>
+    <p:extLst>
+      <p:ext uri="{BB962C8B-B14F-4D97-AF65-F5344CB8AC3E}">
+        <p14:creationId xmlns:p14="http://schemas.microsoft.com/office/powerpoint/2010/main" val="253499051"/>
       </p:ext>
     </p:extLst>
   </p:cSld>

</xml_diff>

<commit_message>
WEBSITE-138: multiple changes to img, ppt and pdf documents
</commit_message>
<xml_diff>
--- a/files/GRITTechTips.pptx
+++ b/files/GRITTechTips.pptx
@@ -6,10 +6,10 @@
     <p:sldMasterId id="2147483676" r:id="rId2"/>
   </p:sldMasterIdLst>
   <p:notesMasterIdLst>
-    <p:notesMasterId r:id="rId20"/>
+    <p:notesMasterId r:id="rId24"/>
   </p:notesMasterIdLst>
   <p:handoutMasterIdLst>
-    <p:handoutMasterId r:id="rId21"/>
+    <p:handoutMasterId r:id="rId25"/>
   </p:handoutMasterIdLst>
   <p:sldIdLst>
     <p:sldId id="265" r:id="rId3"/>
@@ -29,6 +29,10 @@
     <p:sldId id="1563" r:id="rId17"/>
     <p:sldId id="1584" r:id="rId18"/>
     <p:sldId id="1585" r:id="rId19"/>
+    <p:sldId id="1586" r:id="rId20"/>
+    <p:sldId id="1587" r:id="rId21"/>
+    <p:sldId id="1588" r:id="rId22"/>
+    <p:sldId id="1589" r:id="rId23"/>
   </p:sldIdLst>
   <p:sldSz cx="12192000" cy="6858000"/>
   <p:notesSz cx="7010400" cy="9296400"/>
@@ -231,7 +235,7 @@
           <a:p>
             <a:fld id="{1B2B353B-17DE-F24E-9686-9B8AC9ABF674}" type="datetimeFigureOut">
               <a:rPr lang="en-US" smtClean="0"/>
-              <a:t>3/30/2020</a:t>
+              <a:t>8/11/2020</a:t>
             </a:fld>
             <a:endParaRPr lang="en-US" dirty="0"/>
           </a:p>
@@ -396,7 +400,7 @@
           <a:p>
             <a:fld id="{6A5E00F6-FCEB-3240-BF91-2FE8D291BB05}" type="datetimeFigureOut">
               <a:rPr lang="en-US" smtClean="0"/>
-              <a:t>3/30/2020</a:t>
+              <a:t>8/11/2020</a:t>
             </a:fld>
             <a:endParaRPr lang="en-US" dirty="0"/>
           </a:p>
@@ -797,29 +801,29 @@
           <a:lstStyle/>
           <a:p>
             <a:r>
-              <a:rPr lang="en-US" dirty="0" smtClean="0"/>
+              <a:rPr lang="en-US" dirty="0"/>
               <a:t>This slide was</a:t>
             </a:r>
             <a:r>
-              <a:rPr lang="en-US" baseline="0" dirty="0" smtClean="0"/>
+              <a:rPr lang="en-US" baseline="0" dirty="0"/>
               <a:t> added per feedback from Office Hours facilitated as part of the Post-Award Training on 1/28/20.</a:t>
             </a:r>
           </a:p>
           <a:p>
-            <a:endParaRPr lang="en-US" baseline="0" dirty="0" smtClean="0"/>
-          </a:p>
-          <a:p>
-            <a:r>
-              <a:rPr lang="en-US" baseline="0" dirty="0" smtClean="0"/>
+            <a:endParaRPr lang="en-US" baseline="0" dirty="0"/>
+          </a:p>
+          <a:p>
+            <a:r>
+              <a:rPr lang="en-US" baseline="0" dirty="0"/>
               <a:t>Many questions are asked about how to check the status of a record in HRS. The first instinct is to use a report, however the Proposal and Award tabs in Huron Grants provide lots of information as well.</a:t>
             </a:r>
           </a:p>
           <a:p>
-            <a:endParaRPr lang="en-US" baseline="0" dirty="0" smtClean="0"/>
-          </a:p>
-          <a:p>
-            <a:r>
-              <a:rPr lang="en-US" baseline="0" dirty="0" smtClean="0"/>
+            <a:endParaRPr lang="en-US" baseline="0" dirty="0"/>
+          </a:p>
+          <a:p>
+            <a:r>
+              <a:rPr lang="en-US" baseline="0" dirty="0"/>
               <a:t>Make sure to search on the appropriate tab – either Proposals or Awards. Keep in mind you can search using multiple filters to find the information you’re looking for.</a:t>
             </a:r>
             <a:endParaRPr lang="en-US" dirty="0"/>
@@ -907,32 +911,32 @@
           <a:lstStyle/>
           <a:p>
             <a:r>
-              <a:rPr lang="en-US" dirty="0" smtClean="0"/>
+              <a:rPr lang="en-US" dirty="0"/>
               <a:t>This slide was</a:t>
             </a:r>
             <a:r>
-              <a:rPr lang="en-US" baseline="0" dirty="0" smtClean="0"/>
+              <a:rPr lang="en-US" baseline="0" dirty="0"/>
               <a:t> added per feedback from Office Hours facilitated as part of the Post-Award Training on 1/28/20.</a:t>
             </a:r>
           </a:p>
           <a:p>
-            <a:endParaRPr lang="en-US" baseline="0" dirty="0" smtClean="0"/>
-          </a:p>
-          <a:p>
-            <a:r>
-              <a:rPr lang="en-US" baseline="0" dirty="0" smtClean="0"/>
+            <a:endParaRPr lang="en-US" baseline="0" dirty="0"/>
+          </a:p>
+          <a:p>
+            <a:r>
+              <a:rPr lang="en-US" baseline="0" dirty="0"/>
               <a:t>Many questions are asked about how to check the status of a record in HRS. The first instinct is to use a report, however the Proposal and Award tabs in Huron Grants provide lots of information as well.</a:t>
             </a:r>
           </a:p>
           <a:p>
-            <a:endParaRPr lang="en-US" baseline="0" dirty="0" smtClean="0"/>
-          </a:p>
-          <a:p>
-            <a:r>
-              <a:rPr lang="en-US" baseline="0" dirty="0" smtClean="0"/>
+            <a:endParaRPr lang="en-US" baseline="0" dirty="0"/>
+          </a:p>
+          <a:p>
+            <a:r>
+              <a:rPr lang="en-US" baseline="0" dirty="0"/>
               <a:t>Make sure to search on the appropriate tab – either Proposals or Awards. Keep in mind you can search using multiple filters to find the information you’re looking for.</a:t>
             </a:r>
-            <a:endParaRPr lang="en-US" dirty="0" smtClean="0"/>
+            <a:endParaRPr lang="en-US" dirty="0"/>
           </a:p>
           <a:p>
             <a:endParaRPr lang="en-US" dirty="0"/>
@@ -1020,23 +1024,23 @@
           <a:lstStyle/>
           <a:p>
             <a:r>
-              <a:rPr lang="en-US" dirty="0" smtClean="0"/>
+              <a:rPr lang="en-US" dirty="0"/>
               <a:t>This slide was</a:t>
             </a:r>
             <a:r>
-              <a:rPr lang="en-US" baseline="0" dirty="0" smtClean="0"/>
+              <a:rPr lang="en-US" baseline="0" dirty="0"/>
               <a:t> added per feedback from Office Hours facilitated as part of the Post-Award Training on 1/28/20.</a:t>
             </a:r>
           </a:p>
           <a:p>
-            <a:endParaRPr lang="en-US" baseline="0" dirty="0" smtClean="0"/>
-          </a:p>
-          <a:p>
-            <a:r>
-              <a:rPr lang="en-US" baseline="0" dirty="0" smtClean="0"/>
+            <a:endParaRPr lang="en-US" baseline="0" dirty="0"/>
+          </a:p>
+          <a:p>
+            <a:r>
+              <a:rPr lang="en-US" baseline="0" dirty="0"/>
               <a:t>If you have questions about the what the different states mean, please see the Appendix in the reference guides available in the Help Center in Huron Grants. Workflow diagrams were recently revised to be more user friendly and easier to understand.</a:t>
             </a:r>
-            <a:endParaRPr lang="en-US" dirty="0" smtClean="0"/>
+            <a:endParaRPr lang="en-US" dirty="0"/>
           </a:p>
           <a:p>
             <a:endParaRPr lang="en-US" dirty="0"/>
@@ -1141,33 +1145,33 @@
               <a:defRPr/>
             </a:pPr>
             <a:r>
-              <a:rPr lang="en-US" dirty="0" smtClean="0"/>
+              <a:rPr lang="en-US" dirty="0"/>
               <a:t>This slide was</a:t>
             </a:r>
             <a:r>
-              <a:rPr lang="en-US" baseline="0" dirty="0" smtClean="0"/>
+              <a:rPr lang="en-US" baseline="0" dirty="0"/>
               <a:t> added per feedback from Office Hours facilitated as part of the Post-Award Training on 1/28/20.</a:t>
             </a:r>
           </a:p>
           <a:p>
-            <a:endParaRPr lang="en-US" dirty="0" smtClean="0"/>
-          </a:p>
-          <a:p>
-            <a:r>
-              <a:rPr lang="en-US" dirty="0" smtClean="0"/>
+            <a:endParaRPr lang="en-US" dirty="0"/>
+          </a:p>
+          <a:p>
+            <a:r>
+              <a:rPr lang="en-US" dirty="0"/>
               <a:t>We’ve received several questions about how to tell if a</a:t>
             </a:r>
             <a:r>
-              <a:rPr lang="en-US" baseline="0" dirty="0" smtClean="0"/>
+              <a:rPr lang="en-US" baseline="0" dirty="0"/>
               <a:t> proposal has been updated when an award notice has been received – this is because the notice could be sent to the Office of Research, the PI, or the Department Administrator. </a:t>
             </a:r>
           </a:p>
           <a:p>
-            <a:endParaRPr lang="en-US" baseline="0" dirty="0" smtClean="0"/>
-          </a:p>
-          <a:p>
-            <a:r>
-              <a:rPr lang="en-US" baseline="0" dirty="0" smtClean="0"/>
+            <a:endParaRPr lang="en-US" baseline="0" dirty="0"/>
+          </a:p>
+          <a:p>
+            <a:r>
+              <a:rPr lang="en-US" baseline="0" dirty="0"/>
               <a:t>When the proposal is sent to the sponsor, it is updated to the “Pending Sponsor Review” status. When the proposal is updated, the status is also updated to one of the statuses noted in the red box in the image above.  The next slide explains how you can update the proposal if it is still in the “Pending Sponsor Review” status.</a:t>
             </a:r>
             <a:endParaRPr lang="en-US" dirty="0"/>
@@ -1272,24 +1276,24 @@
               <a:defRPr/>
             </a:pPr>
             <a:r>
-              <a:rPr lang="en-US" dirty="0" smtClean="0"/>
+              <a:rPr lang="en-US" dirty="0"/>
               <a:t>This slide was</a:t>
             </a:r>
             <a:r>
-              <a:rPr lang="en-US" baseline="0" dirty="0" smtClean="0"/>
+              <a:rPr lang="en-US" baseline="0" dirty="0"/>
               <a:t> added per feedback from Office Hours facilitated as part of the Post-Award Training on 1/28/20.</a:t>
             </a:r>
           </a:p>
           <a:p>
-            <a:endParaRPr lang="en-US" dirty="0" smtClean="0"/>
-          </a:p>
-          <a:p>
-            <a:r>
-              <a:rPr lang="en-US" dirty="0" smtClean="0"/>
+            <a:endParaRPr lang="en-US" dirty="0"/>
+          </a:p>
+          <a:p>
+            <a:r>
+              <a:rPr lang="en-US" dirty="0"/>
               <a:t>If the</a:t>
             </a:r>
             <a:r>
-              <a:rPr lang="en-US" baseline="0" dirty="0" smtClean="0"/>
+              <a:rPr lang="en-US" baseline="0" dirty="0"/>
               <a:t> PI or Department Administrator needs to update the proposal with the sponsor decision, use the “Notify SPO of Grant Status” activity to do so. Executing this activity sends an email notification to the assigned Specialist and the state is updated.</a:t>
             </a:r>
             <a:endParaRPr lang="en-US" dirty="0"/>
@@ -1534,6 +1538,309 @@
 </p:notes>
 </file>
 
+<file path=ppt/notesSlides/notesSlide17.xml><?xml version="1.0" encoding="utf-8"?>
+<p:notes xmlns:a="http://schemas.openxmlformats.org/drawingml/2006/main" xmlns:r="http://schemas.openxmlformats.org/officeDocument/2006/relationships" xmlns:p="http://schemas.openxmlformats.org/presentationml/2006/main">
+  <p:cSld>
+    <p:spTree>
+      <p:nvGrpSpPr>
+        <p:cNvPr id="1" name=""/>
+        <p:cNvGrpSpPr/>
+        <p:nvPr/>
+      </p:nvGrpSpPr>
+      <p:grpSpPr>
+        <a:xfrm>
+          <a:off x="0" y="0"/>
+          <a:ext cx="0" cy="0"/>
+          <a:chOff x="0" y="0"/>
+          <a:chExt cx="0" cy="0"/>
+        </a:xfrm>
+      </p:grpSpPr>
+      <p:sp>
+        <p:nvSpPr>
+          <p:cNvPr id="2" name="Slide Image Placeholder 1"/>
+          <p:cNvSpPr>
+            <a:spLocks noGrp="1" noRot="1" noChangeAspect="1"/>
+          </p:cNvSpPr>
+          <p:nvPr>
+            <p:ph type="sldImg"/>
+          </p:nvPr>
+        </p:nvSpPr>
+        <p:spPr/>
+      </p:sp>
+      <p:sp>
+        <p:nvSpPr>
+          <p:cNvPr id="3" name="Notes Placeholder 2"/>
+          <p:cNvSpPr>
+            <a:spLocks noGrp="1"/>
+          </p:cNvSpPr>
+          <p:nvPr>
+            <p:ph type="body" idx="1"/>
+          </p:nvPr>
+        </p:nvSpPr>
+        <p:spPr/>
+        <p:txBody>
+          <a:bodyPr/>
+          <a:lstStyle/>
+          <a:p>
+            <a:pPr marL="0" marR="0" lvl="0" indent="0" algn="l" defTabSz="914400" rtl="0" eaLnBrk="1" fontAlgn="auto" latinLnBrk="0" hangingPunct="1">
+              <a:lnSpc>
+                <a:spcPct val="100000"/>
+              </a:lnSpc>
+              <a:spcBef>
+                <a:spcPts val="0"/>
+              </a:spcBef>
+              <a:spcAft>
+                <a:spcPts val="0"/>
+              </a:spcAft>
+              <a:buClrTx/>
+              <a:buSzTx/>
+              <a:buFontTx/>
+              <a:buNone/>
+              <a:tabLst/>
+              <a:defRPr/>
+            </a:pPr>
+            <a:endParaRPr lang="en-US" dirty="0"/>
+          </a:p>
+        </p:txBody>
+      </p:sp>
+      <p:sp>
+        <p:nvSpPr>
+          <p:cNvPr id="4" name="Slide Number Placeholder 3"/>
+          <p:cNvSpPr>
+            <a:spLocks noGrp="1"/>
+          </p:cNvSpPr>
+          <p:nvPr>
+            <p:ph type="sldNum" sz="quarter" idx="10"/>
+          </p:nvPr>
+        </p:nvSpPr>
+        <p:spPr/>
+        <p:txBody>
+          <a:bodyPr/>
+          <a:lstStyle/>
+          <a:p>
+            <a:fld id="{BF01AEB7-DF1E-074E-AD3C-BD912806E15D}" type="slidenum">
+              <a:rPr lang="en-US" smtClean="0"/>
+              <a:t>18</a:t>
+            </a:fld>
+            <a:endParaRPr lang="en-US" dirty="0"/>
+          </a:p>
+        </p:txBody>
+      </p:sp>
+    </p:spTree>
+    <p:extLst>
+      <p:ext uri="{BB962C8B-B14F-4D97-AF65-F5344CB8AC3E}">
+        <p14:creationId xmlns:p14="http://schemas.microsoft.com/office/powerpoint/2010/main" val="1800283047"/>
+      </p:ext>
+    </p:extLst>
+  </p:cSld>
+  <p:clrMapOvr>
+    <a:masterClrMapping/>
+  </p:clrMapOvr>
+</p:notes>
+</file>
+
+<file path=ppt/notesSlides/notesSlide18.xml><?xml version="1.0" encoding="utf-8"?>
+<p:notes xmlns:a="http://schemas.openxmlformats.org/drawingml/2006/main" xmlns:r="http://schemas.openxmlformats.org/officeDocument/2006/relationships" xmlns:p="http://schemas.openxmlformats.org/presentationml/2006/main">
+  <p:cSld>
+    <p:spTree>
+      <p:nvGrpSpPr>
+        <p:cNvPr id="1" name=""/>
+        <p:cNvGrpSpPr/>
+        <p:nvPr/>
+      </p:nvGrpSpPr>
+      <p:grpSpPr>
+        <a:xfrm>
+          <a:off x="0" y="0"/>
+          <a:ext cx="0" cy="0"/>
+          <a:chOff x="0" y="0"/>
+          <a:chExt cx="0" cy="0"/>
+        </a:xfrm>
+      </p:grpSpPr>
+      <p:sp>
+        <p:nvSpPr>
+          <p:cNvPr id="2" name="Slide Image Placeholder 1"/>
+          <p:cNvSpPr>
+            <a:spLocks noGrp="1" noRot="1" noChangeAspect="1"/>
+          </p:cNvSpPr>
+          <p:nvPr>
+            <p:ph type="sldImg"/>
+          </p:nvPr>
+        </p:nvSpPr>
+        <p:spPr/>
+      </p:sp>
+      <p:sp>
+        <p:nvSpPr>
+          <p:cNvPr id="3" name="Notes Placeholder 2"/>
+          <p:cNvSpPr>
+            <a:spLocks noGrp="1"/>
+          </p:cNvSpPr>
+          <p:nvPr>
+            <p:ph type="body" idx="1"/>
+          </p:nvPr>
+        </p:nvSpPr>
+        <p:spPr/>
+        <p:txBody>
+          <a:bodyPr/>
+          <a:lstStyle/>
+          <a:p>
+            <a:pPr marL="0" marR="0" lvl="0" indent="0" algn="l" defTabSz="914400" rtl="0" eaLnBrk="1" fontAlgn="auto" latinLnBrk="0" hangingPunct="1">
+              <a:lnSpc>
+                <a:spcPct val="100000"/>
+              </a:lnSpc>
+              <a:spcBef>
+                <a:spcPts val="0"/>
+              </a:spcBef>
+              <a:spcAft>
+                <a:spcPts val="0"/>
+              </a:spcAft>
+              <a:buClrTx/>
+              <a:buSzTx/>
+              <a:buFontTx/>
+              <a:buNone/>
+              <a:tabLst/>
+              <a:defRPr/>
+            </a:pPr>
+            <a:endParaRPr lang="en-US" dirty="0"/>
+          </a:p>
+        </p:txBody>
+      </p:sp>
+      <p:sp>
+        <p:nvSpPr>
+          <p:cNvPr id="4" name="Slide Number Placeholder 3"/>
+          <p:cNvSpPr>
+            <a:spLocks noGrp="1"/>
+          </p:cNvSpPr>
+          <p:nvPr>
+            <p:ph type="sldNum" sz="quarter" idx="10"/>
+          </p:nvPr>
+        </p:nvSpPr>
+        <p:spPr/>
+        <p:txBody>
+          <a:bodyPr/>
+          <a:lstStyle/>
+          <a:p>
+            <a:fld id="{BF01AEB7-DF1E-074E-AD3C-BD912806E15D}" type="slidenum">
+              <a:rPr lang="en-US" smtClean="0"/>
+              <a:t>19</a:t>
+            </a:fld>
+            <a:endParaRPr lang="en-US" dirty="0"/>
+          </a:p>
+        </p:txBody>
+      </p:sp>
+    </p:spTree>
+    <p:extLst>
+      <p:ext uri="{BB962C8B-B14F-4D97-AF65-F5344CB8AC3E}">
+        <p14:creationId xmlns:p14="http://schemas.microsoft.com/office/powerpoint/2010/main" val="458086706"/>
+      </p:ext>
+    </p:extLst>
+  </p:cSld>
+  <p:clrMapOvr>
+    <a:masterClrMapping/>
+  </p:clrMapOvr>
+</p:notes>
+</file>
+
+<file path=ppt/notesSlides/notesSlide19.xml><?xml version="1.0" encoding="utf-8"?>
+<p:notes xmlns:a="http://schemas.openxmlformats.org/drawingml/2006/main" xmlns:r="http://schemas.openxmlformats.org/officeDocument/2006/relationships" xmlns:p="http://schemas.openxmlformats.org/presentationml/2006/main">
+  <p:cSld>
+    <p:spTree>
+      <p:nvGrpSpPr>
+        <p:cNvPr id="1" name=""/>
+        <p:cNvGrpSpPr/>
+        <p:nvPr/>
+      </p:nvGrpSpPr>
+      <p:grpSpPr>
+        <a:xfrm>
+          <a:off x="0" y="0"/>
+          <a:ext cx="0" cy="0"/>
+          <a:chOff x="0" y="0"/>
+          <a:chExt cx="0" cy="0"/>
+        </a:xfrm>
+      </p:grpSpPr>
+      <p:sp>
+        <p:nvSpPr>
+          <p:cNvPr id="2" name="Slide Image Placeholder 1"/>
+          <p:cNvSpPr>
+            <a:spLocks noGrp="1" noRot="1" noChangeAspect="1"/>
+          </p:cNvSpPr>
+          <p:nvPr>
+            <p:ph type="sldImg"/>
+          </p:nvPr>
+        </p:nvSpPr>
+        <p:spPr/>
+      </p:sp>
+      <p:sp>
+        <p:nvSpPr>
+          <p:cNvPr id="3" name="Notes Placeholder 2"/>
+          <p:cNvSpPr>
+            <a:spLocks noGrp="1"/>
+          </p:cNvSpPr>
+          <p:nvPr>
+            <p:ph type="body" idx="1"/>
+          </p:nvPr>
+        </p:nvSpPr>
+        <p:spPr/>
+        <p:txBody>
+          <a:bodyPr/>
+          <a:lstStyle/>
+          <a:p>
+            <a:pPr marL="0" marR="0" lvl="0" indent="0" algn="l" defTabSz="914400" rtl="0" eaLnBrk="1" fontAlgn="auto" latinLnBrk="0" hangingPunct="1">
+              <a:lnSpc>
+                <a:spcPct val="100000"/>
+              </a:lnSpc>
+              <a:spcBef>
+                <a:spcPts val="0"/>
+              </a:spcBef>
+              <a:spcAft>
+                <a:spcPts val="0"/>
+              </a:spcAft>
+              <a:buClrTx/>
+              <a:buSzTx/>
+              <a:buFontTx/>
+              <a:buNone/>
+              <a:tabLst/>
+              <a:defRPr/>
+            </a:pPr>
+            <a:endParaRPr lang="en-US" dirty="0"/>
+          </a:p>
+        </p:txBody>
+      </p:sp>
+      <p:sp>
+        <p:nvSpPr>
+          <p:cNvPr id="4" name="Slide Number Placeholder 3"/>
+          <p:cNvSpPr>
+            <a:spLocks noGrp="1"/>
+          </p:cNvSpPr>
+          <p:nvPr>
+            <p:ph type="sldNum" sz="quarter" idx="10"/>
+          </p:nvPr>
+        </p:nvSpPr>
+        <p:spPr/>
+        <p:txBody>
+          <a:bodyPr/>
+          <a:lstStyle/>
+          <a:p>
+            <a:fld id="{BF01AEB7-DF1E-074E-AD3C-BD912806E15D}" type="slidenum">
+              <a:rPr lang="en-US" smtClean="0"/>
+              <a:t>20</a:t>
+            </a:fld>
+            <a:endParaRPr lang="en-US" dirty="0"/>
+          </a:p>
+        </p:txBody>
+      </p:sp>
+    </p:spTree>
+    <p:extLst>
+      <p:ext uri="{BB962C8B-B14F-4D97-AF65-F5344CB8AC3E}">
+        <p14:creationId xmlns:p14="http://schemas.microsoft.com/office/powerpoint/2010/main" val="1686073814"/>
+      </p:ext>
+    </p:extLst>
+  </p:cSld>
+  <p:clrMapOvr>
+    <a:masterClrMapping/>
+  </p:clrMapOvr>
+</p:notes>
+</file>
+
 <file path=ppt/notesSlides/notesSlide2.xml><?xml version="1.0" encoding="utf-8"?>
 <p:notes xmlns:a="http://schemas.openxmlformats.org/drawingml/2006/main" xmlns:r="http://schemas.openxmlformats.org/officeDocument/2006/relationships" xmlns:p="http://schemas.openxmlformats.org/presentationml/2006/main">
   <p:cSld>
@@ -1754,6 +2061,107 @@
     <p:extLst>
       <p:ext uri="{BB962C8B-B14F-4D97-AF65-F5344CB8AC3E}">
         <p14:creationId xmlns:p14="http://schemas.microsoft.com/office/powerpoint/2010/main" val="2655021063"/>
+      </p:ext>
+    </p:extLst>
+  </p:cSld>
+  <p:clrMapOvr>
+    <a:masterClrMapping/>
+  </p:clrMapOvr>
+</p:notes>
+</file>
+
+<file path=ppt/notesSlides/notesSlide20.xml><?xml version="1.0" encoding="utf-8"?>
+<p:notes xmlns:a="http://schemas.openxmlformats.org/drawingml/2006/main" xmlns:r="http://schemas.openxmlformats.org/officeDocument/2006/relationships" xmlns:p="http://schemas.openxmlformats.org/presentationml/2006/main">
+  <p:cSld>
+    <p:spTree>
+      <p:nvGrpSpPr>
+        <p:cNvPr id="1" name=""/>
+        <p:cNvGrpSpPr/>
+        <p:nvPr/>
+      </p:nvGrpSpPr>
+      <p:grpSpPr>
+        <a:xfrm>
+          <a:off x="0" y="0"/>
+          <a:ext cx="0" cy="0"/>
+          <a:chOff x="0" y="0"/>
+          <a:chExt cx="0" cy="0"/>
+        </a:xfrm>
+      </p:grpSpPr>
+      <p:sp>
+        <p:nvSpPr>
+          <p:cNvPr id="2" name="Slide Image Placeholder 1"/>
+          <p:cNvSpPr>
+            <a:spLocks noGrp="1" noRot="1" noChangeAspect="1"/>
+          </p:cNvSpPr>
+          <p:nvPr>
+            <p:ph type="sldImg"/>
+          </p:nvPr>
+        </p:nvSpPr>
+        <p:spPr/>
+      </p:sp>
+      <p:sp>
+        <p:nvSpPr>
+          <p:cNvPr id="3" name="Notes Placeholder 2"/>
+          <p:cNvSpPr>
+            <a:spLocks noGrp="1"/>
+          </p:cNvSpPr>
+          <p:nvPr>
+            <p:ph type="body" idx="1"/>
+          </p:nvPr>
+        </p:nvSpPr>
+        <p:spPr/>
+        <p:txBody>
+          <a:bodyPr/>
+          <a:lstStyle/>
+          <a:p>
+            <a:pPr marL="0" marR="0" lvl="0" indent="0" algn="l" defTabSz="914400" rtl="0" eaLnBrk="1" fontAlgn="auto" latinLnBrk="0" hangingPunct="1">
+              <a:lnSpc>
+                <a:spcPct val="100000"/>
+              </a:lnSpc>
+              <a:spcBef>
+                <a:spcPts val="0"/>
+              </a:spcBef>
+              <a:spcAft>
+                <a:spcPts val="0"/>
+              </a:spcAft>
+              <a:buClrTx/>
+              <a:buSzTx/>
+              <a:buFontTx/>
+              <a:buNone/>
+              <a:tabLst/>
+              <a:defRPr/>
+            </a:pPr>
+            <a:endParaRPr lang="en-US" dirty="0"/>
+          </a:p>
+        </p:txBody>
+      </p:sp>
+      <p:sp>
+        <p:nvSpPr>
+          <p:cNvPr id="4" name="Slide Number Placeholder 3"/>
+          <p:cNvSpPr>
+            <a:spLocks noGrp="1"/>
+          </p:cNvSpPr>
+          <p:nvPr>
+            <p:ph type="sldNum" sz="quarter" idx="10"/>
+          </p:nvPr>
+        </p:nvSpPr>
+        <p:spPr/>
+        <p:txBody>
+          <a:bodyPr/>
+          <a:lstStyle/>
+          <a:p>
+            <a:fld id="{BF01AEB7-DF1E-074E-AD3C-BD912806E15D}" type="slidenum">
+              <a:rPr lang="en-US" smtClean="0"/>
+              <a:t>21</a:t>
+            </a:fld>
+            <a:endParaRPr lang="en-US" dirty="0"/>
+          </a:p>
+        </p:txBody>
+      </p:sp>
+    </p:spTree>
+    <p:extLst>
+      <p:ext uri="{BB962C8B-B14F-4D97-AF65-F5344CB8AC3E}">
+        <p14:creationId xmlns:p14="http://schemas.microsoft.com/office/powerpoint/2010/main" val="3852080130"/>
       </p:ext>
     </p:extLst>
   </p:cSld>
@@ -2576,7 +2984,7 @@
           <a:p>
             <a:fld id="{05F0F182-A738-D344-AD4C-0014E2FCF0E4}" type="datetimeFigureOut">
               <a:rPr lang="en-US" smtClean="0"/>
-              <a:t>3/30/2020</a:t>
+              <a:t>8/11/2020</a:t>
             </a:fld>
             <a:endParaRPr lang="en-US" dirty="0"/>
           </a:p>
@@ -2754,7 +3162,7 @@
           <a:p>
             <a:fld id="{05F0F182-A738-D344-AD4C-0014E2FCF0E4}" type="datetimeFigureOut">
               <a:rPr lang="en-US" smtClean="0"/>
-              <a:t>3/30/2020</a:t>
+              <a:t>8/11/2020</a:t>
             </a:fld>
             <a:endParaRPr lang="en-US" dirty="0"/>
           </a:p>
@@ -2942,7 +3350,7 @@
           <a:p>
             <a:fld id="{05F0F182-A738-D344-AD4C-0014E2FCF0E4}" type="datetimeFigureOut">
               <a:rPr lang="en-US" smtClean="0"/>
-              <a:t>3/30/2020</a:t>
+              <a:t>8/11/2020</a:t>
             </a:fld>
             <a:endParaRPr lang="en-US" dirty="0"/>
           </a:p>
@@ -3315,7 +3723,7 @@
                 </a:solidFill>
               </a:rPr>
               <a:pPr/>
-              <a:t>3/30/2020</a:t>
+              <a:t>8/11/2020</a:t>
             </a:fld>
             <a:endParaRPr lang="en-US" dirty="0">
               <a:solidFill>
@@ -3607,7 +4015,7 @@
                 </a:solidFill>
               </a:rPr>
               <a:pPr/>
-              <a:t>3/30/2020</a:t>
+              <a:t>8/11/2020</a:t>
             </a:fld>
             <a:endParaRPr lang="en-US" dirty="0">
               <a:solidFill>
@@ -3941,7 +4349,7 @@
                 </a:solidFill>
               </a:rPr>
               <a:pPr/>
-              <a:t>3/30/2020</a:t>
+              <a:t>8/11/2020</a:t>
             </a:fld>
             <a:endParaRPr lang="en-US" dirty="0">
               <a:solidFill>
@@ -4409,7 +4817,7 @@
                 </a:solidFill>
               </a:rPr>
               <a:pPr/>
-              <a:t>3/30/2020</a:t>
+              <a:t>8/11/2020</a:t>
             </a:fld>
             <a:endParaRPr lang="en-US" dirty="0">
               <a:solidFill>
@@ -4573,7 +4981,7 @@
                 </a:solidFill>
               </a:rPr>
               <a:pPr/>
-              <a:t>3/30/2020</a:t>
+              <a:t>8/11/2020</a:t>
             </a:fld>
             <a:endParaRPr lang="en-US" dirty="0">
               <a:solidFill>
@@ -4714,7 +5122,7 @@
                 </a:solidFill>
               </a:rPr>
               <a:pPr/>
-              <a:t>3/30/2020</a:t>
+              <a:t>8/11/2020</a:t>
             </a:fld>
             <a:endParaRPr lang="en-US" dirty="0">
               <a:solidFill>
@@ -5037,7 +5445,7 @@
                 </a:solidFill>
               </a:rPr>
               <a:pPr/>
-              <a:t>3/30/2020</a:t>
+              <a:t>8/11/2020</a:t>
             </a:fld>
             <a:endParaRPr lang="en-US" dirty="0">
               <a:solidFill>
@@ -5240,7 +5648,7 @@
           <a:p>
             <a:fld id="{05F0F182-A738-D344-AD4C-0014E2FCF0E4}" type="datetimeFigureOut">
               <a:rPr lang="en-US" smtClean="0"/>
-              <a:t>3/30/2020</a:t>
+              <a:t>8/11/2020</a:t>
             </a:fld>
             <a:endParaRPr lang="en-US" dirty="0"/>
           </a:p>
@@ -5524,7 +5932,7 @@
                 </a:solidFill>
               </a:rPr>
               <a:pPr/>
-              <a:t>3/30/2020</a:t>
+              <a:t>8/11/2020</a:t>
             </a:fld>
             <a:endParaRPr lang="en-US" dirty="0">
               <a:solidFill>
@@ -5740,7 +6148,7 @@
                 </a:solidFill>
               </a:rPr>
               <a:pPr/>
-              <a:t>3/30/2020</a:t>
+              <a:t>8/11/2020</a:t>
             </a:fld>
             <a:endParaRPr lang="en-US" dirty="0">
               <a:solidFill>
@@ -5966,7 +6374,7 @@
                 </a:solidFill>
               </a:rPr>
               <a:pPr/>
-              <a:t>3/30/2020</a:t>
+              <a:t>8/11/2020</a:t>
             </a:fld>
             <a:endParaRPr lang="en-US" dirty="0">
               <a:solidFill>
@@ -6243,7 +6651,7 @@
           <a:p>
             <a:fld id="{05F0F182-A738-D344-AD4C-0014E2FCF0E4}" type="datetimeFigureOut">
               <a:rPr lang="en-US" smtClean="0"/>
-              <a:t>3/30/2020</a:t>
+              <a:t>8/11/2020</a:t>
             </a:fld>
             <a:endParaRPr lang="en-US" dirty="0"/>
           </a:p>
@@ -6483,7 +6891,7 @@
           <a:p>
             <a:fld id="{05F0F182-A738-D344-AD4C-0014E2FCF0E4}" type="datetimeFigureOut">
               <a:rPr lang="en-US" smtClean="0"/>
-              <a:t>3/30/2020</a:t>
+              <a:t>8/11/2020</a:t>
             </a:fld>
             <a:endParaRPr lang="en-US" dirty="0"/>
           </a:p>
@@ -6858,7 +7266,7 @@
           <a:p>
             <a:fld id="{05F0F182-A738-D344-AD4C-0014E2FCF0E4}" type="datetimeFigureOut">
               <a:rPr lang="en-US" smtClean="0"/>
-              <a:t>3/30/2020</a:t>
+              <a:t>8/11/2020</a:t>
             </a:fld>
             <a:endParaRPr lang="en-US" dirty="0"/>
           </a:p>
@@ -7086,7 +7494,7 @@
           <a:p>
             <a:fld id="{05F0F182-A738-D344-AD4C-0014E2FCF0E4}" type="datetimeFigureOut">
               <a:rPr lang="en-US" smtClean="0"/>
-              <a:t>3/30/2020</a:t>
+              <a:t>8/11/2020</a:t>
             </a:fld>
             <a:endParaRPr lang="en-US" dirty="0"/>
           </a:p>
@@ -7371,7 +7779,7 @@
           <a:p>
             <a:fld id="{05F0F182-A738-D344-AD4C-0014E2FCF0E4}" type="datetimeFigureOut">
               <a:rPr lang="en-US" smtClean="0"/>
-              <a:t>3/30/2020</a:t>
+              <a:t>8/11/2020</a:t>
             </a:fld>
             <a:endParaRPr lang="en-US" dirty="0"/>
           </a:p>
@@ -7635,7 +8043,7 @@
           <a:p>
             <a:fld id="{05F0F182-A738-D344-AD4C-0014E2FCF0E4}" type="datetimeFigureOut">
               <a:rPr lang="en-US" smtClean="0"/>
-              <a:t>3/30/2020</a:t>
+              <a:t>8/11/2020</a:t>
             </a:fld>
             <a:endParaRPr lang="en-US" dirty="0"/>
           </a:p>
@@ -7904,7 +8312,7 @@
             <a:fld id="{05F0F182-A738-D344-AD4C-0014E2FCF0E4}" type="datetimeFigureOut">
               <a:rPr lang="en-US" smtClean="0"/>
               <a:pPr/>
-              <a:t>3/30/2020</a:t>
+              <a:t>8/11/2020</a:t>
             </a:fld>
             <a:endParaRPr lang="en-US" dirty="0"/>
           </a:p>
@@ -8937,15 +9345,6 @@
                 <a:spcPct val="50000"/>
               </a:spcBef>
             </a:pPr>
-            <a:r>
-              <a:rPr lang="en-US" b="1" dirty="0">
-                <a:solidFill>
-                  <a:schemeClr val="bg1"/>
-                </a:solidFill>
-                <a:latin typeface="Candara" panose="020E0502030303020204" pitchFamily="34" charset="0"/>
-              </a:rPr>
-              <a:t/>
-            </a:r>
             <a:br>
               <a:rPr lang="en-US" b="1" dirty="0">
                 <a:solidFill>
@@ -8954,15 +9353,6 @@
                 <a:latin typeface="Candara" panose="020E0502030303020204" pitchFamily="34" charset="0"/>
               </a:rPr>
             </a:br>
-            <a:r>
-              <a:rPr lang="en-US" b="1" dirty="0">
-                <a:solidFill>
-                  <a:schemeClr val="bg1"/>
-                </a:solidFill>
-                <a:latin typeface="Candara" panose="020E0502030303020204" pitchFamily="34" charset="0"/>
-              </a:rPr>
-              <a:t/>
-            </a:r>
             <a:br>
               <a:rPr lang="en-US" b="1" dirty="0">
                 <a:solidFill>
@@ -8972,7 +9362,7 @@
               </a:rPr>
             </a:br>
             <a:r>
-              <a:rPr lang="en-US" b="1" dirty="0" smtClean="0">
+              <a:rPr lang="en-US" b="1" dirty="0">
                 <a:solidFill>
                   <a:schemeClr val="bg1"/>
                 </a:solidFill>
@@ -8981,7 +9371,7 @@
               <a:t>Tech Tips </a:t>
             </a:r>
             <a:br>
-              <a:rPr lang="en-US" b="1" dirty="0" smtClean="0">
+              <a:rPr lang="en-US" b="1" dirty="0">
                 <a:solidFill>
                   <a:schemeClr val="bg1"/>
                 </a:solidFill>
@@ -8989,22 +9379,13 @@
               </a:rPr>
             </a:br>
             <a:r>
-              <a:rPr lang="en-US" b="1" dirty="0" smtClean="0">
+              <a:rPr lang="en-US" b="1" dirty="0">
                 <a:solidFill>
                   <a:schemeClr val="bg1"/>
                 </a:solidFill>
                 <a:latin typeface="Candara" panose="020E0502030303020204" pitchFamily="34" charset="0"/>
               </a:rPr>
               <a:t>from the EXCIT Meetings</a:t>
-            </a:r>
-            <a:r>
-              <a:rPr lang="en-US" sz="2800" b="1" dirty="0">
-                <a:solidFill>
-                  <a:schemeClr val="bg1"/>
-                </a:solidFill>
-                <a:latin typeface="Candara" panose="020E0502030303020204" pitchFamily="34" charset="0"/>
-              </a:rPr>
-              <a:t/>
             </a:r>
             <a:br>
               <a:rPr lang="en-US" sz="2800" b="1" dirty="0">
@@ -9014,15 +9395,6 @@
                 <a:latin typeface="Candara" panose="020E0502030303020204" pitchFamily="34" charset="0"/>
               </a:rPr>
             </a:br>
-            <a:r>
-              <a:rPr lang="en-US" sz="2800" b="1" dirty="0">
-                <a:solidFill>
-                  <a:schemeClr val="bg1"/>
-                </a:solidFill>
-                <a:latin typeface="Candara" panose="020E0502030303020204" pitchFamily="34" charset="0"/>
-              </a:rPr>
-              <a:t/>
-            </a:r>
             <a:br>
               <a:rPr lang="en-US" sz="2800" b="1" dirty="0">
                 <a:solidFill>
@@ -9032,22 +9404,13 @@
               </a:rPr>
             </a:br>
             <a:r>
-              <a:rPr lang="en-US" sz="2800" b="1" dirty="0" smtClean="0">
+              <a:rPr lang="en-US" sz="2800" b="1" dirty="0">
                 <a:solidFill>
                   <a:schemeClr val="bg1"/>
                 </a:solidFill>
                 <a:latin typeface="Candara" panose="020E0502030303020204" pitchFamily="34" charset="0"/>
               </a:rPr>
               <a:t>Presented by GRIT</a:t>
-            </a:r>
-            <a:r>
-              <a:rPr lang="en-US" sz="2800" b="1" dirty="0">
-                <a:solidFill>
-                  <a:schemeClr val="bg1"/>
-                </a:solidFill>
-                <a:latin typeface="Candara" panose="020E0502030303020204" pitchFamily="34" charset="0"/>
-              </a:rPr>
-              <a:t/>
             </a:r>
             <a:br>
               <a:rPr lang="en-US" sz="2800" b="1" dirty="0">
@@ -9117,13 +9480,6 @@
   <p:clrMapOvr>
     <a:masterClrMapping/>
   </p:clrMapOvr>
-  <p:timing>
-    <p:tnLst>
-      <p:par>
-        <p:cTn id="1" dur="indefinite" restart="never" nodeType="tmRoot"/>
-      </p:par>
-    </p:tnLst>
-  </p:timing>
 </p:sld>
 </file>
 
@@ -9409,10 +9765,9 @@
           <a:lstStyle/>
           <a:p>
             <a:r>
-              <a:rPr lang="en-US" dirty="0" smtClean="0"/>
+              <a:rPr lang="en-US" dirty="0"/>
               <a:t>Presented on 2/19/20</a:t>
             </a:r>
-            <a:endParaRPr lang="en-US" dirty="0"/>
           </a:p>
         </p:txBody>
       </p:sp>
@@ -9426,13 +9781,6 @@
   <p:clrMapOvr>
     <a:masterClrMapping/>
   </p:clrMapOvr>
-  <p:timing>
-    <p:tnLst>
-      <p:par>
-        <p:cTn id="1" dur="indefinite" restart="never" nodeType="tmRoot"/>
-      </p:par>
-    </p:tnLst>
-  </p:timing>
 </p:sld>
 </file>
 
@@ -9580,10 +9928,9 @@
           <a:lstStyle/>
           <a:p>
             <a:r>
-              <a:rPr lang="en-US" dirty="0" smtClean="0"/>
+              <a:rPr lang="en-US" dirty="0"/>
               <a:t>Presented on 2/19/20</a:t>
             </a:r>
-            <a:endParaRPr lang="en-US" dirty="0"/>
           </a:p>
         </p:txBody>
       </p:sp>
@@ -9597,13 +9944,6 @@
   <p:clrMapOvr>
     <a:masterClrMapping/>
   </p:clrMapOvr>
-  <p:timing>
-    <p:tnLst>
-      <p:par>
-        <p:cTn id="1" dur="indefinite" restart="never" nodeType="tmRoot"/>
-      </p:par>
-    </p:tnLst>
-  </p:timing>
 </p:sld>
 </file>
 
@@ -9751,10 +10091,9 @@
           <a:lstStyle/>
           <a:p>
             <a:r>
-              <a:rPr lang="en-US" dirty="0" smtClean="0"/>
+              <a:rPr lang="en-US" dirty="0"/>
               <a:t>Presented on 2/19/20</a:t>
             </a:r>
-            <a:endParaRPr lang="en-US" dirty="0"/>
           </a:p>
         </p:txBody>
       </p:sp>
@@ -9768,13 +10107,6 @@
   <p:clrMapOvr>
     <a:masterClrMapping/>
   </p:clrMapOvr>
-  <p:timing>
-    <p:tnLst>
-      <p:par>
-        <p:cTn id="1" dur="indefinite" restart="never" nodeType="tmRoot"/>
-      </p:par>
-    </p:tnLst>
-  </p:timing>
 </p:sld>
 </file>
 
@@ -9934,10 +10266,9 @@
           <a:lstStyle/>
           <a:p>
             <a:r>
-              <a:rPr lang="en-US" dirty="0" smtClean="0"/>
+              <a:rPr lang="en-US" dirty="0"/>
               <a:t>Presented on 2/19/20</a:t>
             </a:r>
-            <a:endParaRPr lang="en-US" dirty="0"/>
           </a:p>
         </p:txBody>
       </p:sp>
@@ -9951,13 +10282,6 @@
   <p:clrMapOvr>
     <a:masterClrMapping/>
   </p:clrMapOvr>
-  <p:timing>
-    <p:tnLst>
-      <p:par>
-        <p:cTn id="1" dur="indefinite" restart="never" nodeType="tmRoot"/>
-      </p:par>
-    </p:tnLst>
-  </p:timing>
 </p:sld>
 </file>
 
@@ -10088,10 +10412,9 @@
           <a:lstStyle/>
           <a:p>
             <a:r>
-              <a:rPr lang="en-US" dirty="0" smtClean="0"/>
+              <a:rPr lang="en-US" dirty="0"/>
               <a:t>Presented on 2/19/20</a:t>
             </a:r>
-            <a:endParaRPr lang="en-US" dirty="0"/>
           </a:p>
         </p:txBody>
       </p:sp>
@@ -10105,13 +10428,6 @@
   <p:clrMapOvr>
     <a:masterClrMapping/>
   </p:clrMapOvr>
-  <p:timing>
-    <p:tnLst>
-      <p:par>
-        <p:cTn id="1" dur="indefinite" restart="never" nodeType="tmRoot"/>
-      </p:par>
-    </p:tnLst>
-  </p:timing>
 </p:sld>
 </file>
 
@@ -10308,10 +10624,9 @@
           <a:lstStyle/>
           <a:p>
             <a:r>
-              <a:rPr lang="en-US" dirty="0" smtClean="0"/>
+              <a:rPr lang="en-US" dirty="0"/>
               <a:t>Presented on 2/19/20</a:t>
             </a:r>
-            <a:endParaRPr lang="en-US" dirty="0"/>
           </a:p>
         </p:txBody>
       </p:sp>
@@ -10325,13 +10640,6 @@
   <p:clrMapOvr>
     <a:masterClrMapping/>
   </p:clrMapOvr>
-  <p:timing>
-    <p:tnLst>
-      <p:par>
-        <p:cTn id="1" dur="indefinite" restart="never" nodeType="tmRoot"/>
-      </p:par>
-    </p:tnLst>
-  </p:timing>
 </p:sld>
 </file>
 
@@ -10409,14 +10717,9 @@
           <a:lstStyle/>
           <a:p>
             <a:r>
-              <a:rPr lang="en-US" dirty="0" smtClean="0"/>
-              <a:t>Presented on </a:t>
-            </a:r>
-            <a:r>
-              <a:rPr lang="en-US" dirty="0" smtClean="0"/>
-              <a:t>3/25/20</a:t>
-            </a:r>
-            <a:endParaRPr lang="en-US" dirty="0"/>
+              <a:rPr lang="en-US" dirty="0"/>
+              <a:t>Presented on 3/25/20</a:t>
+            </a:r>
           </a:p>
         </p:txBody>
       </p:sp>
@@ -10608,14 +10911,14 @@
           <a:p>
             <a:pPr lvl="1"/>
             <a:r>
-              <a:rPr lang="en-US" dirty="0" smtClean="0"/>
+              <a:rPr lang="en-US" dirty="0"/>
               <a:t>Deleting documents copied when the “Copy” activity is used</a:t>
             </a:r>
           </a:p>
           <a:p>
             <a:pPr lvl="2"/>
             <a:r>
-              <a:rPr lang="en-US" dirty="0" smtClean="0"/>
+              <a:rPr lang="en-US" dirty="0"/>
               <a:t>If a document was added when the specialist sent the proposal to the sponsor, it will show on the copied proposal and cannot be removed in the “Upload Documents” activity. Specialist can delete this document when choosing to submit the copied proposal and upload the correct one.</a:t>
             </a:r>
           </a:p>
@@ -10624,65 +10927,65 @@
               <a:buFont typeface="Arial" panose="020B0604020202020204" pitchFamily="34" charset="0"/>
               <a:buNone/>
             </a:pPr>
-            <a:endParaRPr lang="en-US" dirty="0" smtClean="0"/>
+            <a:endParaRPr lang="en-US" dirty="0"/>
           </a:p>
           <a:p>
             <a:pPr lvl="1"/>
             <a:r>
-              <a:rPr lang="en-US" dirty="0" smtClean="0"/>
+              <a:rPr lang="en-US" dirty="0"/>
               <a:t>Requesting Access to Huron for New and Moved Users</a:t>
             </a:r>
           </a:p>
           <a:p>
             <a:pPr lvl="2"/>
             <a:r>
-              <a:rPr lang="en-US" dirty="0" smtClean="0"/>
+              <a:rPr lang="en-US" dirty="0"/>
               <a:t>Open a ticket </a:t>
             </a:r>
             <a:r>
-              <a:rPr lang="en-US" dirty="0" smtClean="0">
+              <a:rPr lang="en-US" dirty="0">
                 <a:hlinkClick r:id="rId3"/>
               </a:rPr>
               <a:t>GRITServiceDesk@ucf.edu</a:t>
             </a:r>
             <a:r>
-              <a:rPr lang="en-US" dirty="0" smtClean="0"/>
+              <a:rPr lang="en-US" dirty="0"/>
               <a:t> and indicate to which systems the user requires access </a:t>
             </a:r>
           </a:p>
           <a:p>
             <a:pPr lvl="2"/>
             <a:r>
-              <a:rPr lang="en-US" dirty="0" smtClean="0"/>
+              <a:rPr lang="en-US" dirty="0"/>
               <a:t>New users are automatically added to Huron once there are provided through the PeopleSoft HR data feed</a:t>
             </a:r>
           </a:p>
           <a:p>
             <a:pPr lvl="2"/>
             <a:r>
-              <a:rPr lang="en-US" dirty="0" smtClean="0"/>
+              <a:rPr lang="en-US" dirty="0"/>
               <a:t>Huron Grants BA assigns access levels depending on what the user will need to do</a:t>
             </a:r>
           </a:p>
           <a:p>
             <a:pPr lvl="3"/>
             <a:r>
-              <a:rPr lang="en-US" dirty="0" smtClean="0"/>
+              <a:rPr lang="en-US" dirty="0"/>
               <a:t>Please provide employee name, ID and intended job function/role (Contract Manager, Department Admin., OR </a:t>
             </a:r>
             <a:r>
-              <a:rPr lang="en-US" dirty="0" err="1" smtClean="0"/>
+              <a:rPr lang="en-US" dirty="0" err="1"/>
               <a:t>or</a:t>
             </a:r>
             <a:r>
-              <a:rPr lang="en-US" dirty="0" smtClean="0"/>
+              <a:rPr lang="en-US" dirty="0"/>
               <a:t> Dept. student assistants, etc.) </a:t>
             </a:r>
           </a:p>
           <a:p>
             <a:pPr lvl="3"/>
             <a:r>
-              <a:rPr lang="en-US" dirty="0" smtClean="0"/>
+              <a:rPr lang="en-US" dirty="0"/>
               <a:t>Note: We cannot add Huron access levels until the user is available through the HR feed</a:t>
             </a:r>
           </a:p>
@@ -10702,13 +11005,6 @@
   <p:clrMapOvr>
     <a:masterClrMapping/>
   </p:clrMapOvr>
-  <p:timing>
-    <p:tnLst>
-      <p:par>
-        <p:cTn id="1" dur="indefinite" restart="never" nodeType="tmRoot"/>
-      </p:par>
-    </p:tnLst>
-  </p:timing>
 </p:sld>
 </file>
 
@@ -10786,14 +11082,9 @@
           <a:lstStyle/>
           <a:p>
             <a:r>
-              <a:rPr lang="en-US" dirty="0" smtClean="0"/>
-              <a:t>Presented on </a:t>
-            </a:r>
-            <a:r>
-              <a:rPr lang="en-US" dirty="0" smtClean="0"/>
-              <a:t>3/25/20</a:t>
-            </a:r>
-            <a:endParaRPr lang="en-US" dirty="0"/>
+              <a:rPr lang="en-US" dirty="0"/>
+              <a:t>Presented on 3/25/20</a:t>
+            </a:r>
           </a:p>
         </p:txBody>
       </p:sp>
@@ -10906,13 +11197,354 @@
   <p:clrMapOvr>
     <a:masterClrMapping/>
   </p:clrMapOvr>
-  <p:timing>
-    <p:tnLst>
-      <p:par>
-        <p:cTn id="1" dur="indefinite" restart="never" nodeType="tmRoot"/>
-      </p:par>
-    </p:tnLst>
-  </p:timing>
+</p:sld>
+</file>
+
+<file path=ppt/slides/slide18.xml><?xml version="1.0" encoding="utf-8"?>
+<p:sld xmlns:a="http://schemas.openxmlformats.org/drawingml/2006/main" xmlns:r="http://schemas.openxmlformats.org/officeDocument/2006/relationships" xmlns:p="http://schemas.openxmlformats.org/presentationml/2006/main">
+  <p:cSld>
+    <p:spTree>
+      <p:nvGrpSpPr>
+        <p:cNvPr id="1" name=""/>
+        <p:cNvGrpSpPr/>
+        <p:nvPr/>
+      </p:nvGrpSpPr>
+      <p:grpSpPr>
+        <a:xfrm>
+          <a:off x="0" y="0"/>
+          <a:ext cx="0" cy="0"/>
+          <a:chOff x="0" y="0"/>
+          <a:chExt cx="0" cy="0"/>
+        </a:xfrm>
+      </p:grpSpPr>
+      <p:sp>
+        <p:nvSpPr>
+          <p:cNvPr id="2" name="Title 1"/>
+          <p:cNvSpPr>
+            <a:spLocks noGrp="1"/>
+          </p:cNvSpPr>
+          <p:nvPr>
+            <p:ph type="title"/>
+          </p:nvPr>
+        </p:nvSpPr>
+        <p:spPr>
+          <a:xfrm>
+            <a:off x="838200" y="365128"/>
+            <a:ext cx="10515600" cy="617511"/>
+          </a:xfrm>
+        </p:spPr>
+        <p:txBody>
+          <a:bodyPr>
+            <a:noAutofit/>
+          </a:bodyPr>
+          <a:lstStyle/>
+          <a:p>
+            <a:r>
+              <a:rPr lang="en-US" dirty="0"/>
+              <a:t>Huron Grants – Tech Tips</a:t>
+            </a:r>
+          </a:p>
+        </p:txBody>
+      </p:sp>
+      <p:sp>
+        <p:nvSpPr>
+          <p:cNvPr id="7" name="TextBox 6"/>
+          <p:cNvSpPr txBox="1"/>
+          <p:nvPr/>
+        </p:nvSpPr>
+        <p:spPr>
+          <a:xfrm>
+            <a:off x="9760819" y="97917"/>
+            <a:ext cx="2251510" cy="369332"/>
+          </a:xfrm>
+          <a:prstGeom prst="rect">
+            <a:avLst/>
+          </a:prstGeom>
+          <a:noFill/>
+          <a:ln>
+            <a:solidFill>
+              <a:schemeClr val="tx1"/>
+            </a:solidFill>
+          </a:ln>
+        </p:spPr>
+        <p:txBody>
+          <a:bodyPr wrap="square" rtlCol="0">
+            <a:spAutoFit/>
+          </a:bodyPr>
+          <a:lstStyle/>
+          <a:p>
+            <a:r>
+              <a:rPr lang="en-US" dirty="0"/>
+              <a:t>Presented on 5/27/20</a:t>
+            </a:r>
+          </a:p>
+        </p:txBody>
+      </p:sp>
+      <p:sp>
+        <p:nvSpPr>
+          <p:cNvPr id="5" name="Content Placeholder 2"/>
+          <p:cNvSpPr>
+            <a:spLocks noGrp="1"/>
+          </p:cNvSpPr>
+          <p:nvPr>
+            <p:ph idx="1"/>
+          </p:nvPr>
+        </p:nvSpPr>
+        <p:spPr>
+          <a:xfrm>
+            <a:off x="370974" y="1380817"/>
+            <a:ext cx="10515600" cy="4726309"/>
+          </a:xfrm>
+        </p:spPr>
+        <p:txBody>
+          <a:bodyPr>
+            <a:normAutofit/>
+          </a:bodyPr>
+          <a:lstStyle/>
+          <a:p>
+            <a:r>
+              <a:rPr lang="en-US" dirty="0">
+                <a:latin typeface="Helvetica Neue"/>
+              </a:rPr>
+              <a:t>GRIT Information Systems Access</a:t>
+            </a:r>
+            <a:endParaRPr lang="en-US" dirty="0"/>
+          </a:p>
+          <a:p>
+            <a:pPr lvl="1"/>
+            <a:r>
+              <a:rPr lang="en-US" dirty="0">
+                <a:latin typeface="Helvetica Neue"/>
+              </a:rPr>
+              <a:t>Access to HRS, AURORA, PARIS, TERA.</a:t>
+            </a:r>
+            <a:endParaRPr lang="en-US" dirty="0"/>
+          </a:p>
+          <a:p>
+            <a:pPr lvl="1"/>
+            <a:r>
+              <a:rPr lang="en-US" dirty="0">
+                <a:latin typeface="Helvetica Neue"/>
+              </a:rPr>
+              <a:t>Available in training materials and on the Project Wahoo Website </a:t>
+            </a:r>
+            <a:r>
+              <a:rPr lang="en-US" dirty="0">
+                <a:latin typeface="Helvetica Neue"/>
+                <a:hlinkClick r:id="rId3"/>
+              </a:rPr>
+              <a:t>https://wahoo.research.ucf.edu</a:t>
+            </a:r>
+            <a:endParaRPr lang="en-US" dirty="0"/>
+          </a:p>
+          <a:p>
+            <a:pPr lvl="1"/>
+            <a:r>
+              <a:rPr lang="en-US" dirty="0">
+                <a:latin typeface="Helvetica Neue"/>
+              </a:rPr>
+              <a:t>Access to systems controlled by SSO and NID</a:t>
+            </a:r>
+            <a:endParaRPr lang="en-US" dirty="0"/>
+          </a:p>
+          <a:p>
+            <a:pPr lvl="1"/>
+            <a:r>
+              <a:rPr lang="en-US" dirty="0">
+                <a:latin typeface="Helvetica Neue"/>
+              </a:rPr>
+              <a:t>Requested by hiring or sponsoring department</a:t>
+            </a:r>
+            <a:endParaRPr lang="en-US" dirty="0"/>
+          </a:p>
+          <a:p>
+            <a:r>
+              <a:rPr lang="en-US" dirty="0">
+                <a:latin typeface="Helvetica Neue"/>
+              </a:rPr>
+              <a:t>Access types</a:t>
+            </a:r>
+            <a:endParaRPr lang="en-US" dirty="0"/>
+          </a:p>
+          <a:p>
+            <a:pPr lvl="1"/>
+            <a:r>
+              <a:rPr lang="en-US" dirty="0">
+                <a:latin typeface="Helvetica Neue"/>
+              </a:rPr>
+              <a:t>New employees who need access on their start date</a:t>
+            </a:r>
+            <a:endParaRPr lang="en-US" dirty="0"/>
+          </a:p>
+          <a:p>
+            <a:pPr lvl="1"/>
+            <a:r>
+              <a:rPr lang="en-US" dirty="0">
+                <a:latin typeface="Helvetica Neue"/>
+              </a:rPr>
+              <a:t>New employees who need access before their start date</a:t>
+            </a:r>
+            <a:endParaRPr lang="en-US" dirty="0"/>
+          </a:p>
+          <a:p>
+            <a:pPr lvl="1"/>
+            <a:r>
+              <a:rPr lang="en-US" dirty="0">
+                <a:latin typeface="Helvetica Neue"/>
+              </a:rPr>
+              <a:t>Users paid by a third party (Arecibo) or unpaid users (courtesy faculty or volunteers</a:t>
+            </a:r>
+            <a:endParaRPr lang="en-US" dirty="0"/>
+          </a:p>
+          <a:p>
+            <a:pPr lvl="2"/>
+            <a:endParaRPr lang="en-US" dirty="0"/>
+          </a:p>
+          <a:p>
+            <a:pPr marL="457200" lvl="1" indent="0">
+              <a:buNone/>
+            </a:pPr>
+            <a:endParaRPr lang="en-US" dirty="0"/>
+          </a:p>
+          <a:p>
+            <a:pPr lvl="3"/>
+            <a:endParaRPr lang="en-US" dirty="0"/>
+          </a:p>
+        </p:txBody>
+      </p:sp>
+    </p:spTree>
+    <p:extLst>
+      <p:ext uri="{BB962C8B-B14F-4D97-AF65-F5344CB8AC3E}">
+        <p14:creationId xmlns:p14="http://schemas.microsoft.com/office/powerpoint/2010/main" val="320775395"/>
+      </p:ext>
+    </p:extLst>
+  </p:cSld>
+  <p:clrMapOvr>
+    <a:masterClrMapping/>
+  </p:clrMapOvr>
+</p:sld>
+</file>
+
+<file path=ppt/slides/slide19.xml><?xml version="1.0" encoding="utf-8"?>
+<p:sld xmlns:a="http://schemas.openxmlformats.org/drawingml/2006/main" xmlns:r="http://schemas.openxmlformats.org/officeDocument/2006/relationships" xmlns:p="http://schemas.openxmlformats.org/presentationml/2006/main">
+  <p:cSld>
+    <p:spTree>
+      <p:nvGrpSpPr>
+        <p:cNvPr id="1" name=""/>
+        <p:cNvGrpSpPr/>
+        <p:nvPr/>
+      </p:nvGrpSpPr>
+      <p:grpSpPr>
+        <a:xfrm>
+          <a:off x="0" y="0"/>
+          <a:ext cx="0" cy="0"/>
+          <a:chOff x="0" y="0"/>
+          <a:chExt cx="0" cy="0"/>
+        </a:xfrm>
+      </p:grpSpPr>
+      <p:sp>
+        <p:nvSpPr>
+          <p:cNvPr id="2" name="Title 1"/>
+          <p:cNvSpPr>
+            <a:spLocks noGrp="1"/>
+          </p:cNvSpPr>
+          <p:nvPr>
+            <p:ph type="title"/>
+          </p:nvPr>
+        </p:nvSpPr>
+        <p:spPr>
+          <a:xfrm>
+            <a:off x="838200" y="365128"/>
+            <a:ext cx="10515600" cy="617511"/>
+          </a:xfrm>
+        </p:spPr>
+        <p:txBody>
+          <a:bodyPr>
+            <a:noAutofit/>
+          </a:bodyPr>
+          <a:lstStyle/>
+          <a:p>
+            <a:r>
+              <a:rPr lang="en-US" dirty="0"/>
+              <a:t>Huron Grants – Tech Tips</a:t>
+            </a:r>
+          </a:p>
+        </p:txBody>
+      </p:sp>
+      <p:sp>
+        <p:nvSpPr>
+          <p:cNvPr id="7" name="TextBox 6"/>
+          <p:cNvSpPr txBox="1"/>
+          <p:nvPr/>
+        </p:nvSpPr>
+        <p:spPr>
+          <a:xfrm>
+            <a:off x="9760819" y="97917"/>
+            <a:ext cx="2251510" cy="369332"/>
+          </a:xfrm>
+          <a:prstGeom prst="rect">
+            <a:avLst/>
+          </a:prstGeom>
+          <a:noFill/>
+          <a:ln>
+            <a:solidFill>
+              <a:schemeClr val="tx1"/>
+            </a:solidFill>
+          </a:ln>
+        </p:spPr>
+        <p:txBody>
+          <a:bodyPr wrap="square" rtlCol="0">
+            <a:spAutoFit/>
+          </a:bodyPr>
+          <a:lstStyle/>
+          <a:p>
+            <a:r>
+              <a:rPr lang="en-US" dirty="0"/>
+              <a:t>Presented on 5/27/20</a:t>
+            </a:r>
+          </a:p>
+        </p:txBody>
+      </p:sp>
+      <p:pic>
+        <p:nvPicPr>
+          <p:cNvPr id="8" name="Picture 6" descr="A screenshot of a cell phone&#10;&#10;Description generated with very high confidence">
+            <a:extLst>
+              <a:ext uri="{FF2B5EF4-FFF2-40B4-BE49-F238E27FC236}">
+                <a16:creationId xmlns:a16="http://schemas.microsoft.com/office/drawing/2014/main" id="{D1DA0454-8106-4F3B-975E-CFE2511709F8}"/>
+              </a:ext>
+            </a:extLst>
+          </p:cNvPr>
+          <p:cNvPicPr>
+            <a:picLocks noChangeAspect="1"/>
+          </p:cNvPicPr>
+          <p:nvPr/>
+        </p:nvPicPr>
+        <p:blipFill>
+          <a:blip r:embed="rId3"/>
+          <a:stretch>
+            <a:fillRect/>
+          </a:stretch>
+        </p:blipFill>
+        <p:spPr>
+          <a:xfrm>
+            <a:off x="838200" y="1343484"/>
+            <a:ext cx="8810624" cy="4832393"/>
+          </a:xfrm>
+          <a:prstGeom prst="rect">
+            <a:avLst/>
+          </a:prstGeom>
+        </p:spPr>
+      </p:pic>
+    </p:spTree>
+    <p:extLst>
+      <p:ext uri="{BB962C8B-B14F-4D97-AF65-F5344CB8AC3E}">
+        <p14:creationId xmlns:p14="http://schemas.microsoft.com/office/powerpoint/2010/main" val="1538209444"/>
+      </p:ext>
+    </p:extLst>
+  </p:cSld>
+  <p:clrMapOvr>
+    <a:masterClrMapping/>
+  </p:clrMapOvr>
 </p:sld>
 </file>
 
@@ -10956,10 +11588,9 @@
           <a:lstStyle/>
           <a:p>
             <a:r>
-              <a:rPr lang="en-US" dirty="0" smtClean="0"/>
+              <a:rPr lang="en-US" dirty="0"/>
               <a:t>Introduction</a:t>
             </a:r>
-            <a:endParaRPr lang="en-US" dirty="0"/>
           </a:p>
         </p:txBody>
       </p:sp>
@@ -10986,29 +11617,29 @@
           <a:lstStyle/>
           <a:p>
             <a:r>
-              <a:rPr lang="en-US" sz="2400" dirty="0" smtClean="0"/>
+              <a:rPr lang="en-US" sz="2400" dirty="0"/>
               <a:t>This slide deck includes “Tech Tips” for modules within the Huron Research Suite (HRS) presented by the Graduate and Research IT (GRIT) team at the monthly EXCIT meetings.</a:t>
             </a:r>
           </a:p>
           <a:p>
             <a:r>
-              <a:rPr lang="en-US" sz="2400" dirty="0" smtClean="0"/>
+              <a:rPr lang="en-US" sz="2400" dirty="0"/>
               <a:t>Tech Tips are based on feedback and common questions from the Office of Research and the Research Community</a:t>
             </a:r>
           </a:p>
           <a:p>
             <a:r>
-              <a:rPr lang="en-US" sz="2400" dirty="0" smtClean="0"/>
+              <a:rPr lang="en-US" sz="2400" dirty="0"/>
               <a:t>Tech Tips are compiled from each of the EXCIT meetings and made available for reference on the Project Wahoo site at </a:t>
             </a:r>
             <a:r>
-              <a:rPr lang="en-US" sz="2400" dirty="0" smtClean="0">
+              <a:rPr lang="en-US" sz="2400" dirty="0">
                 <a:hlinkClick r:id="rId2"/>
               </a:rPr>
               <a:t>https://wahoo.research.ucf.edu</a:t>
             </a:r>
             <a:r>
-              <a:rPr lang="en-US" sz="2400" dirty="0" smtClean="0"/>
+              <a:rPr lang="en-US" sz="2400" dirty="0"/>
               <a:t>.  </a:t>
             </a:r>
             <a:endParaRPr lang="en-US" sz="1800" dirty="0"/>
@@ -11036,13 +11667,402 @@
   <p:clrMapOvr>
     <a:masterClrMapping/>
   </p:clrMapOvr>
-  <p:timing>
-    <p:tnLst>
-      <p:par>
-        <p:cTn id="1" dur="indefinite" restart="never" nodeType="tmRoot"/>
-      </p:par>
-    </p:tnLst>
-  </p:timing>
+</p:sld>
+</file>
+
+<file path=ppt/slides/slide20.xml><?xml version="1.0" encoding="utf-8"?>
+<p:sld xmlns:a="http://schemas.openxmlformats.org/drawingml/2006/main" xmlns:r="http://schemas.openxmlformats.org/officeDocument/2006/relationships" xmlns:p="http://schemas.openxmlformats.org/presentationml/2006/main">
+  <p:cSld>
+    <p:spTree>
+      <p:nvGrpSpPr>
+        <p:cNvPr id="1" name=""/>
+        <p:cNvGrpSpPr/>
+        <p:nvPr/>
+      </p:nvGrpSpPr>
+      <p:grpSpPr>
+        <a:xfrm>
+          <a:off x="0" y="0"/>
+          <a:ext cx="0" cy="0"/>
+          <a:chOff x="0" y="0"/>
+          <a:chExt cx="0" cy="0"/>
+        </a:xfrm>
+      </p:grpSpPr>
+      <p:sp>
+        <p:nvSpPr>
+          <p:cNvPr id="2" name="Title 1"/>
+          <p:cNvSpPr>
+            <a:spLocks noGrp="1"/>
+          </p:cNvSpPr>
+          <p:nvPr>
+            <p:ph type="title"/>
+          </p:nvPr>
+        </p:nvSpPr>
+        <p:spPr>
+          <a:xfrm>
+            <a:off x="838200" y="365128"/>
+            <a:ext cx="10515600" cy="617511"/>
+          </a:xfrm>
+        </p:spPr>
+        <p:txBody>
+          <a:bodyPr>
+            <a:noAutofit/>
+          </a:bodyPr>
+          <a:lstStyle/>
+          <a:p>
+            <a:r>
+              <a:rPr lang="en-US" dirty="0"/>
+              <a:t>Huron Grants – Tech Tips</a:t>
+            </a:r>
+          </a:p>
+        </p:txBody>
+      </p:sp>
+      <p:sp>
+        <p:nvSpPr>
+          <p:cNvPr id="7" name="TextBox 6"/>
+          <p:cNvSpPr txBox="1"/>
+          <p:nvPr/>
+        </p:nvSpPr>
+        <p:spPr>
+          <a:xfrm>
+            <a:off x="9760819" y="97917"/>
+            <a:ext cx="2251510" cy="369332"/>
+          </a:xfrm>
+          <a:prstGeom prst="rect">
+            <a:avLst/>
+          </a:prstGeom>
+          <a:noFill/>
+          <a:ln>
+            <a:solidFill>
+              <a:schemeClr val="tx1"/>
+            </a:solidFill>
+          </a:ln>
+        </p:spPr>
+        <p:txBody>
+          <a:bodyPr wrap="square" rtlCol="0">
+            <a:spAutoFit/>
+          </a:bodyPr>
+          <a:lstStyle/>
+          <a:p>
+            <a:r>
+              <a:rPr lang="en-US" dirty="0"/>
+              <a:t>Presented on 5/27/20</a:t>
+            </a:r>
+          </a:p>
+        </p:txBody>
+      </p:sp>
+      <p:sp>
+        <p:nvSpPr>
+          <p:cNvPr id="5" name="Content Placeholder 2"/>
+          <p:cNvSpPr>
+            <a:spLocks noGrp="1"/>
+          </p:cNvSpPr>
+          <p:nvPr>
+            <p:ph idx="1"/>
+          </p:nvPr>
+        </p:nvSpPr>
+        <p:spPr>
+          <a:xfrm>
+            <a:off x="370974" y="1380817"/>
+            <a:ext cx="10515600" cy="4726309"/>
+          </a:xfrm>
+        </p:spPr>
+        <p:txBody>
+          <a:bodyPr>
+            <a:normAutofit/>
+          </a:bodyPr>
+          <a:lstStyle/>
+          <a:p>
+            <a:r>
+              <a:rPr lang="en-US" dirty="0">
+                <a:latin typeface="Helvetica Neue"/>
+              </a:rPr>
+              <a:t>TBD Sponsor Manual Adjustment</a:t>
+            </a:r>
+            <a:endParaRPr lang="en-US" dirty="0"/>
+          </a:p>
+          <a:p>
+            <a:pPr lvl="1"/>
+            <a:r>
+              <a:rPr lang="en-US" dirty="0">
+                <a:latin typeface="Helvetica Neue"/>
+              </a:rPr>
+              <a:t>Updating the TBD Direct Sponsor may revert an indirect rate to default so check this when making manual adjustments.</a:t>
+            </a:r>
+            <a:endParaRPr lang="en-US" dirty="0"/>
+          </a:p>
+          <a:p>
+            <a:pPr marL="0" indent="0">
+              <a:buNone/>
+            </a:pPr>
+            <a:endParaRPr lang="en-US" dirty="0"/>
+          </a:p>
+          <a:p>
+            <a:r>
+              <a:rPr lang="en-US" dirty="0">
+                <a:latin typeface="Helvetica Neue"/>
+              </a:rPr>
+              <a:t>Adding Editors and Readers to Proposals and Awards</a:t>
+            </a:r>
+            <a:endParaRPr lang="en-US" dirty="0"/>
+          </a:p>
+          <a:p>
+            <a:pPr lvl="1"/>
+            <a:r>
+              <a:rPr lang="en-US" dirty="0">
+                <a:latin typeface="Helvetica Neue"/>
+              </a:rPr>
+              <a:t>GRIT Administrative users do not have this ability</a:t>
+            </a:r>
+            <a:endParaRPr lang="en-US" dirty="0"/>
+          </a:p>
+          <a:p>
+            <a:pPr lvl="1"/>
+            <a:r>
+              <a:rPr lang="en-US" dirty="0">
+                <a:latin typeface="Helvetica Neue"/>
+              </a:rPr>
+              <a:t>Need to have someone on the record use the manage guest list functionality to add as editors. </a:t>
+            </a:r>
+            <a:endParaRPr lang="en-US" dirty="0"/>
+          </a:p>
+          <a:p>
+            <a:pPr lvl="1"/>
+            <a:r>
+              <a:rPr lang="en-US" dirty="0">
+                <a:latin typeface="Helvetica Neue"/>
+              </a:rPr>
+              <a:t>Specific users are department admins for different colleges. They should be able to add editors and readers to records.</a:t>
+            </a:r>
+            <a:endParaRPr lang="en-US" dirty="0"/>
+          </a:p>
+          <a:p>
+            <a:pPr lvl="2"/>
+            <a:endParaRPr lang="en-US" dirty="0"/>
+          </a:p>
+          <a:p>
+            <a:pPr marL="457200" lvl="1" indent="0">
+              <a:buNone/>
+            </a:pPr>
+            <a:endParaRPr lang="en-US" dirty="0"/>
+          </a:p>
+          <a:p>
+            <a:pPr lvl="3"/>
+            <a:endParaRPr lang="en-US" dirty="0"/>
+          </a:p>
+        </p:txBody>
+      </p:sp>
+    </p:spTree>
+    <p:extLst>
+      <p:ext uri="{BB962C8B-B14F-4D97-AF65-F5344CB8AC3E}">
+        <p14:creationId xmlns:p14="http://schemas.microsoft.com/office/powerpoint/2010/main" val="2572215067"/>
+      </p:ext>
+    </p:extLst>
+  </p:cSld>
+  <p:clrMapOvr>
+    <a:masterClrMapping/>
+  </p:clrMapOvr>
+</p:sld>
+</file>
+
+<file path=ppt/slides/slide21.xml><?xml version="1.0" encoding="utf-8"?>
+<p:sld xmlns:a="http://schemas.openxmlformats.org/drawingml/2006/main" xmlns:r="http://schemas.openxmlformats.org/officeDocument/2006/relationships" xmlns:p="http://schemas.openxmlformats.org/presentationml/2006/main">
+  <p:cSld>
+    <p:spTree>
+      <p:nvGrpSpPr>
+        <p:cNvPr id="1" name=""/>
+        <p:cNvGrpSpPr/>
+        <p:nvPr/>
+      </p:nvGrpSpPr>
+      <p:grpSpPr>
+        <a:xfrm>
+          <a:off x="0" y="0"/>
+          <a:ext cx="0" cy="0"/>
+          <a:chOff x="0" y="0"/>
+          <a:chExt cx="0" cy="0"/>
+        </a:xfrm>
+      </p:grpSpPr>
+      <p:sp>
+        <p:nvSpPr>
+          <p:cNvPr id="2" name="Title 1"/>
+          <p:cNvSpPr>
+            <a:spLocks noGrp="1"/>
+          </p:cNvSpPr>
+          <p:nvPr>
+            <p:ph type="title"/>
+          </p:nvPr>
+        </p:nvSpPr>
+        <p:spPr>
+          <a:xfrm>
+            <a:off x="838200" y="365128"/>
+            <a:ext cx="10515600" cy="617511"/>
+          </a:xfrm>
+        </p:spPr>
+        <p:txBody>
+          <a:bodyPr>
+            <a:noAutofit/>
+          </a:bodyPr>
+          <a:lstStyle/>
+          <a:p>
+            <a:r>
+              <a:rPr lang="en-US" dirty="0"/>
+              <a:t>Huron Grants – Tech Tips</a:t>
+            </a:r>
+          </a:p>
+        </p:txBody>
+      </p:sp>
+      <p:sp>
+        <p:nvSpPr>
+          <p:cNvPr id="7" name="TextBox 6"/>
+          <p:cNvSpPr txBox="1"/>
+          <p:nvPr/>
+        </p:nvSpPr>
+        <p:spPr>
+          <a:xfrm>
+            <a:off x="9760819" y="97917"/>
+            <a:ext cx="2251510" cy="369332"/>
+          </a:xfrm>
+          <a:prstGeom prst="rect">
+            <a:avLst/>
+          </a:prstGeom>
+          <a:noFill/>
+          <a:ln>
+            <a:solidFill>
+              <a:schemeClr val="tx1"/>
+            </a:solidFill>
+          </a:ln>
+        </p:spPr>
+        <p:txBody>
+          <a:bodyPr wrap="square" rtlCol="0">
+            <a:spAutoFit/>
+          </a:bodyPr>
+          <a:lstStyle/>
+          <a:p>
+            <a:r>
+              <a:rPr lang="en-US" dirty="0"/>
+              <a:t>Presented on 7/22/20</a:t>
+            </a:r>
+          </a:p>
+        </p:txBody>
+      </p:sp>
+      <p:sp>
+        <p:nvSpPr>
+          <p:cNvPr id="5" name="Content Placeholder 2"/>
+          <p:cNvSpPr>
+            <a:spLocks noGrp="1"/>
+          </p:cNvSpPr>
+          <p:nvPr>
+            <p:ph idx="1"/>
+          </p:nvPr>
+        </p:nvSpPr>
+        <p:spPr>
+          <a:xfrm>
+            <a:off x="370974" y="1380817"/>
+            <a:ext cx="10515600" cy="4726309"/>
+          </a:xfrm>
+        </p:spPr>
+        <p:txBody>
+          <a:bodyPr>
+            <a:normAutofit/>
+          </a:bodyPr>
+          <a:lstStyle/>
+          <a:p>
+            <a:pPr marL="800100" lvl="1" indent="-342900"/>
+            <a:r>
+              <a:rPr lang="en-US" dirty="0">
+                <a:latin typeface="Helvetica Neue"/>
+              </a:rPr>
+              <a:t>Award Deliverables</a:t>
+            </a:r>
+            <a:endParaRPr lang="en-US" dirty="0"/>
+          </a:p>
+          <a:p>
+            <a:pPr marL="1257300" lvl="2" indent="-342900"/>
+            <a:r>
+              <a:rPr lang="en-US" dirty="0">
+                <a:latin typeface="Helvetica Neue"/>
+              </a:rPr>
+              <a:t>'Responsible Party' and 'Additional staff' assigned to award deliverables need to be added as readers on the parent award.</a:t>
+            </a:r>
+            <a:endParaRPr lang="en-US" dirty="0"/>
+          </a:p>
+          <a:p>
+            <a:pPr marL="1257300" lvl="2" indent="-342900"/>
+            <a:endParaRPr lang="en-US" dirty="0">
+              <a:latin typeface="Helvetica Neue"/>
+            </a:endParaRPr>
+          </a:p>
+          <a:p>
+            <a:pPr marL="800100" lvl="1" indent="-342900"/>
+            <a:r>
+              <a:rPr lang="en-US" dirty="0">
+                <a:latin typeface="Helvetica Neue"/>
+              </a:rPr>
+              <a:t>Co-PIs</a:t>
+            </a:r>
+            <a:endParaRPr lang="en-US" dirty="0"/>
+          </a:p>
+          <a:p>
+            <a:pPr marL="1257300" lvl="2" indent="-342900"/>
+            <a:r>
+              <a:rPr lang="en-US" dirty="0">
+                <a:latin typeface="Helvetica Neue"/>
+              </a:rPr>
+              <a:t>Add as editors on a Proposal</a:t>
+            </a:r>
+            <a:endParaRPr lang="en-US" dirty="0"/>
+          </a:p>
+          <a:p>
+            <a:pPr marL="1257300" lvl="2" indent="-342900"/>
+            <a:endParaRPr lang="en-US" dirty="0">
+              <a:latin typeface="Helvetica Neue"/>
+            </a:endParaRPr>
+          </a:p>
+          <a:p>
+            <a:pPr marL="800100" lvl="1" indent="-342900"/>
+            <a:r>
+              <a:rPr lang="en-US" dirty="0">
+                <a:latin typeface="Helvetica Neue"/>
+              </a:rPr>
+              <a:t>Updates made in Huron, ARGIS, PeopleSoft</a:t>
+            </a:r>
+            <a:endParaRPr lang="en-US" dirty="0"/>
+          </a:p>
+          <a:p>
+            <a:pPr marL="1257300" lvl="2" indent="-342900"/>
+            <a:r>
+              <a:rPr lang="en-US" dirty="0">
+                <a:latin typeface="Helvetica Neue"/>
+              </a:rPr>
+              <a:t>Show in PARIS and AURORA the following day</a:t>
+            </a:r>
+            <a:endParaRPr lang="en-US" dirty="0"/>
+          </a:p>
+          <a:p>
+            <a:pPr lvl="2"/>
+            <a:endParaRPr lang="en-US" dirty="0"/>
+          </a:p>
+          <a:p>
+            <a:pPr marL="457200" lvl="1" indent="0">
+              <a:buNone/>
+            </a:pPr>
+            <a:endParaRPr lang="en-US" dirty="0"/>
+          </a:p>
+          <a:p>
+            <a:pPr lvl="3"/>
+            <a:endParaRPr lang="en-US" dirty="0"/>
+          </a:p>
+        </p:txBody>
+      </p:sp>
+    </p:spTree>
+    <p:extLst>
+      <p:ext uri="{BB962C8B-B14F-4D97-AF65-F5344CB8AC3E}">
+        <p14:creationId xmlns:p14="http://schemas.microsoft.com/office/powerpoint/2010/main" val="3166566221"/>
+      </p:ext>
+    </p:extLst>
+  </p:cSld>
+  <p:clrMapOvr>
+    <a:masterClrMapping/>
+  </p:clrMapOvr>
 </p:sld>
 </file>
 
@@ -11187,13 +12207,6 @@
   <p:clrMapOvr>
     <a:masterClrMapping/>
   </p:clrMapOvr>
-  <p:timing>
-    <p:tnLst>
-      <p:par>
-        <p:cTn id="1" dur="indefinite" restart="never" nodeType="tmRoot"/>
-      </p:par>
-    </p:tnLst>
-  </p:timing>
 </p:sld>
 </file>
 
@@ -11454,10 +12467,9 @@
           <a:lstStyle/>
           <a:p>
             <a:r>
-              <a:rPr lang="en-US" dirty="0" smtClean="0"/>
+              <a:rPr lang="en-US" dirty="0"/>
               <a:t>Presented on 2/19/20</a:t>
             </a:r>
-            <a:endParaRPr lang="en-US" dirty="0"/>
           </a:p>
         </p:txBody>
       </p:sp>
@@ -11471,13 +12483,6 @@
   <p:clrMapOvr>
     <a:masterClrMapping/>
   </p:clrMapOvr>
-  <p:timing>
-    <p:tnLst>
-      <p:par>
-        <p:cTn id="1" dur="indefinite" restart="never" nodeType="tmRoot"/>
-      </p:par>
-    </p:tnLst>
-  </p:timing>
 </p:sld>
 </file>
 
@@ -11738,10 +12743,9 @@
           <a:lstStyle/>
           <a:p>
             <a:r>
-              <a:rPr lang="en-US" dirty="0" smtClean="0"/>
+              <a:rPr lang="en-US" dirty="0"/>
               <a:t>Presented on 2/19/20</a:t>
             </a:r>
-            <a:endParaRPr lang="en-US" dirty="0"/>
           </a:p>
         </p:txBody>
       </p:sp>
@@ -11755,13 +12759,6 @@
   <p:clrMapOvr>
     <a:masterClrMapping/>
   </p:clrMapOvr>
-  <p:timing>
-    <p:tnLst>
-      <p:par>
-        <p:cTn id="1" dur="indefinite" restart="never" nodeType="tmRoot"/>
-      </p:par>
-    </p:tnLst>
-  </p:timing>
 </p:sld>
 </file>
 
@@ -11943,10 +12940,9 @@
           <a:lstStyle/>
           <a:p>
             <a:r>
-              <a:rPr lang="en-US" dirty="0" smtClean="0"/>
+              <a:rPr lang="en-US" dirty="0"/>
               <a:t>Presented on 2/19/20</a:t>
             </a:r>
-            <a:endParaRPr lang="en-US" dirty="0"/>
           </a:p>
         </p:txBody>
       </p:sp>
@@ -11960,13 +12956,6 @@
   <p:clrMapOvr>
     <a:masterClrMapping/>
   </p:clrMapOvr>
-  <p:timing>
-    <p:tnLst>
-      <p:par>
-        <p:cTn id="1" dur="indefinite" restart="never" nodeType="tmRoot"/>
-      </p:par>
-    </p:tnLst>
-  </p:timing>
 </p:sld>
 </file>
 
@@ -12232,10 +13221,9 @@
           <a:lstStyle/>
           <a:p>
             <a:r>
-              <a:rPr lang="en-US" dirty="0" smtClean="0"/>
+              <a:rPr lang="en-US" dirty="0"/>
               <a:t>Presented on 2/19/20</a:t>
             </a:r>
-            <a:endParaRPr lang="en-US" dirty="0"/>
           </a:p>
         </p:txBody>
       </p:sp>
@@ -12249,13 +13237,6 @@
   <p:clrMapOvr>
     <a:masterClrMapping/>
   </p:clrMapOvr>
-  <p:timing>
-    <p:tnLst>
-      <p:par>
-        <p:cTn id="1" dur="indefinite" restart="never" nodeType="tmRoot"/>
-      </p:par>
-    </p:tnLst>
-  </p:timing>
 </p:sld>
 </file>
 
@@ -12491,10 +13472,9 @@
           <a:lstStyle/>
           <a:p>
             <a:r>
-              <a:rPr lang="en-US" dirty="0" smtClean="0"/>
+              <a:rPr lang="en-US" dirty="0"/>
               <a:t>Presented on 2/19/20</a:t>
             </a:r>
-            <a:endParaRPr lang="en-US" dirty="0"/>
           </a:p>
         </p:txBody>
       </p:sp>
@@ -12508,13 +13488,6 @@
   <p:clrMapOvr>
     <a:masterClrMapping/>
   </p:clrMapOvr>
-  <p:timing>
-    <p:tnLst>
-      <p:par>
-        <p:cTn id="1" dur="indefinite" restart="never" nodeType="tmRoot"/>
-      </p:par>
-    </p:tnLst>
-  </p:timing>
 </p:sld>
 </file>
 
@@ -12739,10 +13712,9 @@
           <a:lstStyle/>
           <a:p>
             <a:r>
-              <a:rPr lang="en-US" dirty="0" smtClean="0"/>
+              <a:rPr lang="en-US" dirty="0"/>
               <a:t>Presented on 2/19/20</a:t>
             </a:r>
-            <a:endParaRPr lang="en-US" dirty="0"/>
           </a:p>
         </p:txBody>
       </p:sp>
@@ -12756,13 +13728,6 @@
   <p:clrMapOvr>
     <a:masterClrMapping/>
   </p:clrMapOvr>
-  <p:timing>
-    <p:tnLst>
-      <p:par>
-        <p:cTn id="1" dur="indefinite" restart="never" nodeType="tmRoot"/>
-      </p:par>
-    </p:tnLst>
-  </p:timing>
 </p:sld>
 </file>
 

</xml_diff>